<commit_message>
add performance. work with presentation
</commit_message>
<xml_diff>
--- a/presentation/jpoint2017.pptx
+++ b/presentation/jpoint2017.pptx
@@ -5,7 +5,7 @@
     <p:sldMasterId id="2147483659" r:id="rId1"/>
   </p:sldMasterIdLst>
   <p:notesMasterIdLst>
-    <p:notesMasterId r:id="rId9"/>
+    <p:notesMasterId r:id="rId12"/>
   </p:notesMasterIdLst>
   <p:sldIdLst>
     <p:sldId id="256" r:id="rId2"/>
@@ -13,8 +13,11 @@
     <p:sldId id="258" r:id="rId4"/>
     <p:sldId id="259" r:id="rId5"/>
     <p:sldId id="260" r:id="rId6"/>
-    <p:sldId id="261" r:id="rId7"/>
-    <p:sldId id="262" r:id="rId8"/>
+    <p:sldId id="263" r:id="rId7"/>
+    <p:sldId id="264" r:id="rId8"/>
+    <p:sldId id="261" r:id="rId9"/>
+    <p:sldId id="265" r:id="rId10"/>
+    <p:sldId id="262" r:id="rId11"/>
   </p:sldIdLst>
   <p:sldSz cx="9144000" cy="5143500" type="screen16x9"/>
   <p:notesSz cx="6858000" cy="9144000"/>
@@ -220,6 +223,11 @@
       </a:defRPr>
     </a:lvl9pPr>
   </p:defaultTextStyle>
+  <p:extLst>
+    <p:ext uri="{EFAFB233-063F-42B5-8137-9DF3F51BA10A}">
+      <p15:sldGuideLst xmlns:p15="http://schemas.microsoft.com/office/powerpoint/2012/main"/>
+    </p:ext>
+  </p:extLst>
 </p:presentation>
 </file>
 
@@ -591,6 +599,112 @@
 </p:notes>
 </file>
 
+<file path=ppt/notesSlides/notesSlide10.xml><?xml version="1.0" encoding="utf-8"?>
+<p:notes xmlns:a="http://schemas.openxmlformats.org/drawingml/2006/main" xmlns:r="http://schemas.openxmlformats.org/officeDocument/2006/relationships" xmlns:p="http://schemas.openxmlformats.org/presentationml/2006/main" showMasterSp="0" showMasterPhAnim="0">
+  <p:cSld>
+    <p:spTree>
+      <p:nvGrpSpPr>
+        <p:cNvPr id="1" name="Shape 104"/>
+        <p:cNvGrpSpPr/>
+        <p:nvPr/>
+      </p:nvGrpSpPr>
+      <p:grpSpPr>
+        <a:xfrm>
+          <a:off x="0" y="0"/>
+          <a:ext cx="0" cy="0"/>
+          <a:chOff x="0" y="0"/>
+          <a:chExt cx="0" cy="0"/>
+        </a:xfrm>
+      </p:grpSpPr>
+      <p:sp>
+        <p:nvSpPr>
+          <p:cNvPr id="105" name="Shape 105"/>
+          <p:cNvSpPr>
+            <a:spLocks noGrp="1" noRot="1" noChangeAspect="1"/>
+          </p:cNvSpPr>
+          <p:nvPr>
+            <p:ph type="sldImg" idx="2"/>
+          </p:nvPr>
+        </p:nvSpPr>
+        <p:spPr>
+          <a:xfrm>
+            <a:off x="381000" y="685800"/>
+            <a:ext cx="6096000" cy="3429000"/>
+          </a:xfrm>
+          <a:custGeom>
+            <a:avLst/>
+            <a:gdLst/>
+            <a:ahLst/>
+            <a:cxnLst/>
+            <a:rect l="0" t="0" r="0" b="0"/>
+            <a:pathLst>
+              <a:path w="120000" h="120000" extrusionOk="0">
+                <a:moveTo>
+                  <a:pt x="0" y="0"/>
+                </a:moveTo>
+                <a:lnTo>
+                  <a:pt x="120000" y="0"/>
+                </a:lnTo>
+                <a:lnTo>
+                  <a:pt x="120000" y="120000"/>
+                </a:lnTo>
+                <a:lnTo>
+                  <a:pt x="0" y="120000"/>
+                </a:lnTo>
+                <a:close/>
+              </a:path>
+            </a:pathLst>
+          </a:custGeom>
+        </p:spPr>
+      </p:sp>
+      <p:sp>
+        <p:nvSpPr>
+          <p:cNvPr id="106" name="Shape 106"/>
+          <p:cNvSpPr txBox="1">
+            <a:spLocks noGrp="1"/>
+          </p:cNvSpPr>
+          <p:nvPr>
+            <p:ph type="body" idx="1"/>
+          </p:nvPr>
+        </p:nvSpPr>
+        <p:spPr>
+          <a:xfrm>
+            <a:off x="685800" y="4343400"/>
+            <a:ext cx="5486400" cy="4114800"/>
+          </a:xfrm>
+          <a:prstGeom prst="rect">
+            <a:avLst/>
+          </a:prstGeom>
+        </p:spPr>
+        <p:txBody>
+          <a:bodyPr lIns="91425" tIns="91425" rIns="91425" bIns="91425" anchor="t" anchorCtr="0">
+            <a:noAutofit/>
+          </a:bodyPr>
+          <a:lstStyle/>
+          <a:p>
+            <a:pPr lvl="0">
+              <a:spcBef>
+                <a:spcPts val="0"/>
+              </a:spcBef>
+              <a:buNone/>
+            </a:pPr>
+            <a:endParaRPr/>
+          </a:p>
+        </p:txBody>
+      </p:sp>
+    </p:spTree>
+    <p:extLst>
+      <p:ext uri="{BB962C8B-B14F-4D97-AF65-F5344CB8AC3E}">
+        <p14:creationId xmlns:p14="http://schemas.microsoft.com/office/powerpoint/2010/main" val="423073409"/>
+      </p:ext>
+    </p:extLst>
+  </p:cSld>
+  <p:clrMapOvr>
+    <a:masterClrMapping/>
+  </p:clrMapOvr>
+</p:notes>
+</file>
+
 <file path=ppt/notesSlides/notesSlide2.xml><?xml version="1.0" encoding="utf-8"?>
 <p:notes xmlns:a="http://schemas.openxmlformats.org/drawingml/2006/main" xmlns:r="http://schemas.openxmlformats.org/officeDocument/2006/relationships" xmlns:p="http://schemas.openxmlformats.org/presentationml/2006/main" showMasterSp="0" showMasterPhAnim="0">
   <p:cSld>
@@ -1089,7 +1203,7 @@
   <p:cSld>
     <p:spTree>
       <p:nvGrpSpPr>
-        <p:cNvPr id="1" name="Shape 82"/>
+        <p:cNvPr id="1" name="Shape 76"/>
         <p:cNvGrpSpPr/>
         <p:nvPr/>
       </p:nvGrpSpPr>
@@ -1103,7 +1217,7 @@
       </p:grpSpPr>
       <p:sp>
         <p:nvSpPr>
-          <p:cNvPr id="83" name="Shape 83"/>
+          <p:cNvPr id="77" name="Shape 77"/>
           <p:cNvSpPr>
             <a:spLocks noGrp="1" noRot="1" noChangeAspect="1"/>
           </p:cNvSpPr>
@@ -1144,7 +1258,7 @@
       </p:sp>
       <p:sp>
         <p:nvSpPr>
-          <p:cNvPr id="84" name="Shape 84"/>
+          <p:cNvPr id="78" name="Shape 78"/>
           <p:cNvSpPr txBox="1">
             <a:spLocks noGrp="1"/>
           </p:cNvSpPr>
@@ -1167,7 +1281,7 @@
           </a:bodyPr>
           <a:lstStyle/>
           <a:p>
-            <a:pPr lvl="0" rtl="0">
+            <a:pPr lvl="0">
               <a:spcBef>
                 <a:spcPts val="0"/>
               </a:spcBef>
@@ -1175,7 +1289,7 @@
             </a:pPr>
             <a:r>
               <a:rPr lang="en-GB"/>
-              <a:t>Image with architecture of HIbernate OGM</a:t>
+              <a:t>Talk about how each type store data </a:t>
             </a:r>
           </a:p>
         </p:txBody>
@@ -1183,7 +1297,7 @@
     </p:spTree>
     <p:extLst>
       <p:ext uri="{BB962C8B-B14F-4D97-AF65-F5344CB8AC3E}">
-        <p14:creationId xmlns:p14="http://schemas.microsoft.com/office/powerpoint/2010/main" val="936217032"/>
+        <p14:creationId xmlns:p14="http://schemas.microsoft.com/office/powerpoint/2010/main" val="2868767192"/>
       </p:ext>
     </p:extLst>
   </p:cSld>
@@ -1198,7 +1312,7 @@
   <p:cSld>
     <p:spTree>
       <p:nvGrpSpPr>
-        <p:cNvPr id="1" name="Shape 104"/>
+        <p:cNvPr id="1" name="Shape 76"/>
         <p:cNvGrpSpPr/>
         <p:nvPr/>
       </p:nvGrpSpPr>
@@ -1212,7 +1326,7 @@
       </p:grpSpPr>
       <p:sp>
         <p:nvSpPr>
-          <p:cNvPr id="105" name="Shape 105"/>
+          <p:cNvPr id="77" name="Shape 77"/>
           <p:cNvSpPr>
             <a:spLocks noGrp="1" noRot="1" noChangeAspect="1"/>
           </p:cNvSpPr>
@@ -1222,7 +1336,7 @@
         </p:nvSpPr>
         <p:spPr>
           <a:xfrm>
-            <a:off x="381300" y="685800"/>
+            <a:off x="381000" y="685800"/>
             <a:ext cx="6096000" cy="3429000"/>
           </a:xfrm>
           <a:custGeom>
@@ -1253,7 +1367,7 @@
       </p:sp>
       <p:sp>
         <p:nvSpPr>
-          <p:cNvPr id="106" name="Shape 106"/>
+          <p:cNvPr id="78" name="Shape 78"/>
           <p:cNvSpPr txBox="1">
             <a:spLocks noGrp="1"/>
           </p:cNvSpPr>
@@ -1282,14 +1396,235 @@
               </a:spcBef>
               <a:buNone/>
             </a:pPr>
-            <a:endParaRPr/>
+            <a:r>
+              <a:rPr lang="en-GB"/>
+              <a:t>Talk about how each type store data </a:t>
+            </a:r>
           </a:p>
         </p:txBody>
       </p:sp>
     </p:spTree>
     <p:extLst>
       <p:ext uri="{BB962C8B-B14F-4D97-AF65-F5344CB8AC3E}">
-        <p14:creationId xmlns:p14="http://schemas.microsoft.com/office/powerpoint/2010/main" val="423073409"/>
+        <p14:creationId xmlns:p14="http://schemas.microsoft.com/office/powerpoint/2010/main" val="4222113696"/>
+      </p:ext>
+    </p:extLst>
+  </p:cSld>
+  <p:clrMapOvr>
+    <a:masterClrMapping/>
+  </p:clrMapOvr>
+</p:notes>
+</file>
+
+<file path=ppt/notesSlides/notesSlide8.xml><?xml version="1.0" encoding="utf-8"?>
+<p:notes xmlns:a="http://schemas.openxmlformats.org/drawingml/2006/main" xmlns:r="http://schemas.openxmlformats.org/officeDocument/2006/relationships" xmlns:p="http://schemas.openxmlformats.org/presentationml/2006/main" showMasterSp="0" showMasterPhAnim="0">
+  <p:cSld>
+    <p:spTree>
+      <p:nvGrpSpPr>
+        <p:cNvPr id="1" name="Shape 82"/>
+        <p:cNvGrpSpPr/>
+        <p:nvPr/>
+      </p:nvGrpSpPr>
+      <p:grpSpPr>
+        <a:xfrm>
+          <a:off x="0" y="0"/>
+          <a:ext cx="0" cy="0"/>
+          <a:chOff x="0" y="0"/>
+          <a:chExt cx="0" cy="0"/>
+        </a:xfrm>
+      </p:grpSpPr>
+      <p:sp>
+        <p:nvSpPr>
+          <p:cNvPr id="83" name="Shape 83"/>
+          <p:cNvSpPr>
+            <a:spLocks noGrp="1" noRot="1" noChangeAspect="1"/>
+          </p:cNvSpPr>
+          <p:nvPr>
+            <p:ph type="sldImg" idx="2"/>
+          </p:nvPr>
+        </p:nvSpPr>
+        <p:spPr>
+          <a:xfrm>
+            <a:off x="381000" y="685800"/>
+            <a:ext cx="6096000" cy="3429000"/>
+          </a:xfrm>
+          <a:custGeom>
+            <a:avLst/>
+            <a:gdLst/>
+            <a:ahLst/>
+            <a:cxnLst/>
+            <a:rect l="0" t="0" r="0" b="0"/>
+            <a:pathLst>
+              <a:path w="120000" h="120000" extrusionOk="0">
+                <a:moveTo>
+                  <a:pt x="0" y="0"/>
+                </a:moveTo>
+                <a:lnTo>
+                  <a:pt x="120000" y="0"/>
+                </a:lnTo>
+                <a:lnTo>
+                  <a:pt x="120000" y="120000"/>
+                </a:lnTo>
+                <a:lnTo>
+                  <a:pt x="0" y="120000"/>
+                </a:lnTo>
+                <a:close/>
+              </a:path>
+            </a:pathLst>
+          </a:custGeom>
+        </p:spPr>
+      </p:sp>
+      <p:sp>
+        <p:nvSpPr>
+          <p:cNvPr id="84" name="Shape 84"/>
+          <p:cNvSpPr txBox="1">
+            <a:spLocks noGrp="1"/>
+          </p:cNvSpPr>
+          <p:nvPr>
+            <p:ph type="body" idx="1"/>
+          </p:nvPr>
+        </p:nvSpPr>
+        <p:spPr>
+          <a:xfrm>
+            <a:off x="685800" y="4343400"/>
+            <a:ext cx="5486400" cy="4114800"/>
+          </a:xfrm>
+          <a:prstGeom prst="rect">
+            <a:avLst/>
+          </a:prstGeom>
+        </p:spPr>
+        <p:txBody>
+          <a:bodyPr lIns="91425" tIns="91425" rIns="91425" bIns="91425" anchor="t" anchorCtr="0">
+            <a:noAutofit/>
+          </a:bodyPr>
+          <a:lstStyle/>
+          <a:p>
+            <a:pPr lvl="0" rtl="0">
+              <a:spcBef>
+                <a:spcPts val="0"/>
+              </a:spcBef>
+              <a:buNone/>
+            </a:pPr>
+            <a:r>
+              <a:rPr lang="en-GB"/>
+              <a:t>Image with architecture of HIbernate OGM</a:t>
+            </a:r>
+          </a:p>
+        </p:txBody>
+      </p:sp>
+    </p:spTree>
+    <p:extLst>
+      <p:ext uri="{BB962C8B-B14F-4D97-AF65-F5344CB8AC3E}">
+        <p14:creationId xmlns:p14="http://schemas.microsoft.com/office/powerpoint/2010/main" val="936217032"/>
+      </p:ext>
+    </p:extLst>
+  </p:cSld>
+  <p:clrMapOvr>
+    <a:masterClrMapping/>
+  </p:clrMapOvr>
+</p:notes>
+</file>
+
+<file path=ppt/notesSlides/notesSlide9.xml><?xml version="1.0" encoding="utf-8"?>
+<p:notes xmlns:a="http://schemas.openxmlformats.org/drawingml/2006/main" xmlns:r="http://schemas.openxmlformats.org/officeDocument/2006/relationships" xmlns:p="http://schemas.openxmlformats.org/presentationml/2006/main" showMasterSp="0" showMasterPhAnim="0">
+  <p:cSld>
+    <p:spTree>
+      <p:nvGrpSpPr>
+        <p:cNvPr id="1" name="Shape 76"/>
+        <p:cNvGrpSpPr/>
+        <p:nvPr/>
+      </p:nvGrpSpPr>
+      <p:grpSpPr>
+        <a:xfrm>
+          <a:off x="0" y="0"/>
+          <a:ext cx="0" cy="0"/>
+          <a:chOff x="0" y="0"/>
+          <a:chExt cx="0" cy="0"/>
+        </a:xfrm>
+      </p:grpSpPr>
+      <p:sp>
+        <p:nvSpPr>
+          <p:cNvPr id="77" name="Shape 77"/>
+          <p:cNvSpPr>
+            <a:spLocks noGrp="1" noRot="1" noChangeAspect="1"/>
+          </p:cNvSpPr>
+          <p:nvPr>
+            <p:ph type="sldImg" idx="2"/>
+          </p:nvPr>
+        </p:nvSpPr>
+        <p:spPr>
+          <a:xfrm>
+            <a:off x="381000" y="685800"/>
+            <a:ext cx="6096000" cy="3429000"/>
+          </a:xfrm>
+          <a:custGeom>
+            <a:avLst/>
+            <a:gdLst/>
+            <a:ahLst/>
+            <a:cxnLst/>
+            <a:rect l="0" t="0" r="0" b="0"/>
+            <a:pathLst>
+              <a:path w="120000" h="120000" extrusionOk="0">
+                <a:moveTo>
+                  <a:pt x="0" y="0"/>
+                </a:moveTo>
+                <a:lnTo>
+                  <a:pt x="120000" y="0"/>
+                </a:lnTo>
+                <a:lnTo>
+                  <a:pt x="120000" y="120000"/>
+                </a:lnTo>
+                <a:lnTo>
+                  <a:pt x="0" y="120000"/>
+                </a:lnTo>
+                <a:close/>
+              </a:path>
+            </a:pathLst>
+          </a:custGeom>
+        </p:spPr>
+      </p:sp>
+      <p:sp>
+        <p:nvSpPr>
+          <p:cNvPr id="78" name="Shape 78"/>
+          <p:cNvSpPr txBox="1">
+            <a:spLocks noGrp="1"/>
+          </p:cNvSpPr>
+          <p:nvPr>
+            <p:ph type="body" idx="1"/>
+          </p:nvPr>
+        </p:nvSpPr>
+        <p:spPr>
+          <a:xfrm>
+            <a:off x="685800" y="4343400"/>
+            <a:ext cx="5486400" cy="4114800"/>
+          </a:xfrm>
+          <a:prstGeom prst="rect">
+            <a:avLst/>
+          </a:prstGeom>
+        </p:spPr>
+        <p:txBody>
+          <a:bodyPr lIns="91425" tIns="91425" rIns="91425" bIns="91425" anchor="t" anchorCtr="0">
+            <a:noAutofit/>
+          </a:bodyPr>
+          <a:lstStyle/>
+          <a:p>
+            <a:pPr lvl="0">
+              <a:spcBef>
+                <a:spcPts val="0"/>
+              </a:spcBef>
+              <a:buNone/>
+            </a:pPr>
+            <a:r>
+              <a:rPr lang="en-GB"/>
+              <a:t>Talk about how each type store data </a:t>
+            </a:r>
+          </a:p>
+        </p:txBody>
+      </p:sp>
+    </p:spTree>
+    <p:extLst>
+      <p:ext uri="{BB962C8B-B14F-4D97-AF65-F5344CB8AC3E}">
+        <p14:creationId xmlns:p14="http://schemas.microsoft.com/office/powerpoint/2010/main" val="4260200067"/>
       </p:ext>
     </p:extLst>
   </p:cSld>
@@ -4777,6 +5112,115 @@
 </p:sld>
 </file>
 
+<file path=ppt/slides/slide10.xml><?xml version="1.0" encoding="utf-8"?>
+<p:sld xmlns:a="http://schemas.openxmlformats.org/drawingml/2006/main" xmlns:r="http://schemas.openxmlformats.org/officeDocument/2006/relationships" xmlns:p="http://schemas.openxmlformats.org/presentationml/2006/main">
+  <p:cSld>
+    <p:spTree>
+      <p:nvGrpSpPr>
+        <p:cNvPr id="1" name="Shape 107"/>
+        <p:cNvGrpSpPr/>
+        <p:nvPr/>
+      </p:nvGrpSpPr>
+      <p:grpSpPr>
+        <a:xfrm>
+          <a:off x="0" y="0"/>
+          <a:ext cx="0" cy="0"/>
+          <a:chOff x="0" y="0"/>
+          <a:chExt cx="0" cy="0"/>
+        </a:xfrm>
+      </p:grpSpPr>
+      <p:sp>
+        <p:nvSpPr>
+          <p:cNvPr id="108" name="Shape 108"/>
+          <p:cNvSpPr txBox="1"/>
+          <p:nvPr/>
+        </p:nvSpPr>
+        <p:spPr>
+          <a:xfrm>
+            <a:off x="3738150" y="2181000"/>
+            <a:ext cx="1667700" cy="781500"/>
+          </a:xfrm>
+          <a:prstGeom prst="rect">
+            <a:avLst/>
+          </a:prstGeom>
+          <a:noFill/>
+          <a:ln>
+            <a:noFill/>
+          </a:ln>
+        </p:spPr>
+        <p:txBody>
+          <a:bodyPr lIns="91425" tIns="91425" rIns="91425" bIns="91425" anchor="t" anchorCtr="0">
+            <a:noAutofit/>
+          </a:bodyPr>
+          <a:lstStyle/>
+          <a:p>
+            <a:pPr lvl="0">
+              <a:spcBef>
+                <a:spcPts val="0"/>
+              </a:spcBef>
+              <a:buNone/>
+            </a:pPr>
+            <a:r>
+              <a:rPr lang="en-GB" sz="4800" b="1"/>
+              <a:t>Q&amp;A</a:t>
+            </a:r>
+          </a:p>
+        </p:txBody>
+      </p:sp>
+      <p:sp>
+        <p:nvSpPr>
+          <p:cNvPr id="109" name="Shape 109"/>
+          <p:cNvSpPr txBox="1">
+            <a:spLocks noGrp="1"/>
+          </p:cNvSpPr>
+          <p:nvPr>
+            <p:ph type="sldNum" idx="12"/>
+          </p:nvPr>
+        </p:nvSpPr>
+        <p:spPr>
+          <a:xfrm>
+            <a:off x="8472457" y="4663216"/>
+            <a:ext cx="548700" cy="393600"/>
+          </a:xfrm>
+          <a:prstGeom prst="rect">
+            <a:avLst/>
+          </a:prstGeom>
+        </p:spPr>
+        <p:txBody>
+          <a:bodyPr lIns="91425" tIns="91425" rIns="91425" bIns="91425" anchor="ctr" anchorCtr="0">
+            <a:noAutofit/>
+          </a:bodyPr>
+          <a:lstStyle/>
+          <a:p>
+            <a:pPr lvl="0">
+              <a:spcBef>
+                <a:spcPts val="0"/>
+              </a:spcBef>
+              <a:buNone/>
+            </a:pPr>
+            <a:fld id="{00000000-1234-1234-1234-123412341234}" type="slidenum">
+              <a:rPr lang="en-GB"/>
+              <a:t>10</a:t>
+            </a:fld>
+            <a:endParaRPr lang="en-GB"/>
+          </a:p>
+        </p:txBody>
+      </p:sp>
+    </p:spTree>
+  </p:cSld>
+  <p:clrMapOvr>
+    <a:masterClrMapping/>
+  </p:clrMapOvr>
+  <p:timing>
+    <p:tnLst>
+      <p:par>
+        <p:cTn id="1" dur="indefinite" restart="never" nodeType="tmRoot"/>
+      </p:par>
+    </p:tnLst>
+  </p:timing>
+</p:sld>
+</file>
+
 <file path=ppt/slides/slide2.xml><?xml version="1.0" encoding="utf-8"?>
 <p:sld xmlns:a="http://schemas.openxmlformats.org/drawingml/2006/main" xmlns:r="http://schemas.openxmlformats.org/officeDocument/2006/relationships" xmlns:p="http://schemas.openxmlformats.org/presentationml/2006/main">
   <p:cSld>
@@ -5436,7 +5880,7 @@
   <p:cSld>
     <p:spTree>
       <p:nvGrpSpPr>
-        <p:cNvPr id="1" name="Shape 85"/>
+        <p:cNvPr id="1" name="Shape 79"/>
         <p:cNvGrpSpPr/>
         <p:nvPr/>
       </p:nvGrpSpPr>
@@ -5450,665 +5894,7 @@
       </p:grpSpPr>
       <p:sp>
         <p:nvSpPr>
-          <p:cNvPr id="86" name="Shape 86"/>
-          <p:cNvSpPr txBox="1"/>
-          <p:nvPr/>
-        </p:nvSpPr>
-        <p:spPr>
-          <a:xfrm>
-            <a:off x="524650" y="3622825"/>
-            <a:ext cx="7722000" cy="1032600"/>
-          </a:xfrm>
-          <a:prstGeom prst="rect">
-            <a:avLst/>
-          </a:prstGeom>
-          <a:noFill/>
-          <a:ln w="19050" cap="flat" cmpd="sng">
-            <a:solidFill>
-              <a:srgbClr val="000000"/>
-            </a:solidFill>
-            <a:prstDash val="dot"/>
-            <a:round/>
-            <a:headEnd type="none" w="med" len="med"/>
-            <a:tailEnd type="none" w="med" len="med"/>
-          </a:ln>
-        </p:spPr>
-        <p:txBody>
-          <a:bodyPr lIns="91425" tIns="91425" rIns="91425" bIns="91425" anchor="t" anchorCtr="0">
-            <a:noAutofit/>
-          </a:bodyPr>
-          <a:lstStyle/>
-          <a:p>
-            <a:pPr lvl="0" algn="ctr" rtl="0">
-              <a:spcBef>
-                <a:spcPts val="0"/>
-              </a:spcBef>
-              <a:buNone/>
-            </a:pPr>
-            <a:r>
-              <a:rPr lang="en-GB" b="1"/>
-              <a:t>Hibernate OGM Module for Concrete Storage </a:t>
-            </a:r>
-          </a:p>
-          <a:p>
-            <a:pPr lvl="0" rtl="0">
-              <a:spcBef>
-                <a:spcPts val="0"/>
-              </a:spcBef>
-              <a:buNone/>
-            </a:pPr>
-            <a:endParaRPr/>
-          </a:p>
-        </p:txBody>
-      </p:sp>
-      <p:sp>
-        <p:nvSpPr>
-          <p:cNvPr id="87" name="Shape 87"/>
-          <p:cNvSpPr txBox="1"/>
-          <p:nvPr/>
-        </p:nvSpPr>
-        <p:spPr>
-          <a:xfrm>
-            <a:off x="524850" y="431550"/>
-            <a:ext cx="8117700" cy="559800"/>
-          </a:xfrm>
-          <a:prstGeom prst="rect">
-            <a:avLst/>
-          </a:prstGeom>
-          <a:noFill/>
-          <a:ln>
-            <a:noFill/>
-          </a:ln>
-        </p:spPr>
-        <p:txBody>
-          <a:bodyPr lIns="91425" tIns="91425" rIns="91425" bIns="91425" anchor="t" anchorCtr="0">
-            <a:noAutofit/>
-          </a:bodyPr>
-          <a:lstStyle/>
-          <a:p>
-            <a:pPr marL="457200" lvl="0" indent="-355600" rtl="0">
-              <a:lnSpc>
-                <a:spcPct val="200000"/>
-              </a:lnSpc>
-              <a:spcBef>
-                <a:spcPts val="0"/>
-              </a:spcBef>
-              <a:buSzPct val="100000"/>
-              <a:buAutoNum type="arabicPeriod" startAt="3"/>
-            </a:pPr>
-            <a:r>
-              <a:rPr lang="en-GB" sz="2000" b="1"/>
-              <a:t>Architecture</a:t>
-            </a:r>
-          </a:p>
-          <a:p>
-            <a:pPr marL="457200" lvl="0" indent="0" rtl="0">
-              <a:lnSpc>
-                <a:spcPct val="150000"/>
-              </a:lnSpc>
-              <a:spcBef>
-                <a:spcPts val="0"/>
-              </a:spcBef>
-              <a:buNone/>
-            </a:pPr>
-            <a:endParaRPr sz="1800" b="1"/>
-          </a:p>
-        </p:txBody>
-      </p:sp>
-      <p:sp>
-        <p:nvSpPr>
-          <p:cNvPr id="88" name="Shape 88"/>
-          <p:cNvSpPr txBox="1"/>
-          <p:nvPr/>
-        </p:nvSpPr>
-        <p:spPr>
-          <a:xfrm>
-            <a:off x="5481725" y="1104948"/>
-            <a:ext cx="2765100" cy="647400"/>
-          </a:xfrm>
-          <a:prstGeom prst="rect">
-            <a:avLst/>
-          </a:prstGeom>
-          <a:noFill/>
-          <a:ln w="19050" cap="flat" cmpd="sng">
-            <a:solidFill>
-              <a:srgbClr val="000000"/>
-            </a:solidFill>
-            <a:prstDash val="solid"/>
-            <a:round/>
-            <a:headEnd type="none" w="med" len="med"/>
-            <a:tailEnd type="none" w="med" len="med"/>
-          </a:ln>
-        </p:spPr>
-        <p:txBody>
-          <a:bodyPr lIns="91425" tIns="91425" rIns="91425" bIns="91425" anchor="ctr" anchorCtr="0">
-            <a:noAutofit/>
-          </a:bodyPr>
-          <a:lstStyle/>
-          <a:p>
-            <a:pPr lvl="0" algn="ctr" rtl="0">
-              <a:spcBef>
-                <a:spcPts val="0"/>
-              </a:spcBef>
-              <a:buNone/>
-            </a:pPr>
-            <a:r>
-              <a:rPr lang="en-GB" sz="1800" b="1"/>
-              <a:t>Hibernate ORM Core</a:t>
-            </a:r>
-          </a:p>
-          <a:p>
-            <a:pPr lvl="0" rtl="0">
-              <a:spcBef>
-                <a:spcPts val="0"/>
-              </a:spcBef>
-              <a:buNone/>
-            </a:pPr>
-            <a:endParaRPr/>
-          </a:p>
-        </p:txBody>
-      </p:sp>
-      <p:sp>
-        <p:nvSpPr>
-          <p:cNvPr id="89" name="Shape 89"/>
-          <p:cNvSpPr txBox="1"/>
-          <p:nvPr/>
-        </p:nvSpPr>
-        <p:spPr>
-          <a:xfrm>
-            <a:off x="524850" y="1051025"/>
-            <a:ext cx="3627300" cy="750900"/>
-          </a:xfrm>
-          <a:prstGeom prst="rect">
-            <a:avLst/>
-          </a:prstGeom>
-          <a:noFill/>
-          <a:ln w="19050" cap="flat" cmpd="sng">
-            <a:solidFill>
-              <a:srgbClr val="000000"/>
-            </a:solidFill>
-            <a:prstDash val="solid"/>
-            <a:round/>
-            <a:headEnd type="none" w="med" len="med"/>
-            <a:tailEnd type="none" w="med" len="med"/>
-          </a:ln>
-        </p:spPr>
-        <p:txBody>
-          <a:bodyPr lIns="91425" tIns="91425" rIns="91425" bIns="91425" anchor="t" anchorCtr="0">
-            <a:noAutofit/>
-          </a:bodyPr>
-          <a:lstStyle/>
-          <a:p>
-            <a:pPr lvl="0">
-              <a:spcBef>
-                <a:spcPts val="0"/>
-              </a:spcBef>
-              <a:buClr>
-                <a:schemeClr val="dk1"/>
-              </a:buClr>
-              <a:buFont typeface="Arial"/>
-              <a:buNone/>
-            </a:pPr>
-            <a:r>
-              <a:rPr lang="en-GB"/>
-              <a:t>em.getTransaction().begin();</a:t>
-            </a:r>
-          </a:p>
-          <a:p>
-            <a:pPr lvl="0">
-              <a:spcBef>
-                <a:spcPts val="0"/>
-              </a:spcBef>
-              <a:buClr>
-                <a:schemeClr val="dk1"/>
-              </a:buClr>
-              <a:buFont typeface="Arial"/>
-              <a:buNone/>
-            </a:pPr>
-            <a:r>
-              <a:rPr lang="en-GB"/>
-              <a:t>em.persist(</a:t>
-            </a:r>
-            <a:r>
-              <a:rPr lang="en-GB">
-                <a:solidFill>
-                  <a:schemeClr val="dk1"/>
-                </a:solidFill>
-              </a:rPr>
-              <a:t>new Person("name1")</a:t>
-            </a:r>
-            <a:r>
-              <a:rPr lang="en-GB"/>
-              <a:t>);</a:t>
-            </a:r>
-          </a:p>
-          <a:p>
-            <a:pPr lvl="0">
-              <a:spcBef>
-                <a:spcPts val="0"/>
-              </a:spcBef>
-              <a:buClr>
-                <a:schemeClr val="dk1"/>
-              </a:buClr>
-              <a:buFont typeface="Arial"/>
-              <a:buNone/>
-            </a:pPr>
-            <a:r>
-              <a:rPr lang="en-GB"/>
-              <a:t>em.getTransaction().commit();</a:t>
-            </a:r>
-          </a:p>
-          <a:p>
-            <a:pPr lvl="0">
-              <a:spcBef>
-                <a:spcPts val="0"/>
-              </a:spcBef>
-              <a:buNone/>
-            </a:pPr>
-            <a:endParaRPr/>
-          </a:p>
-        </p:txBody>
-      </p:sp>
-      <p:cxnSp>
-        <p:nvCxnSpPr>
-          <p:cNvPr id="90" name="Shape 90"/>
-          <p:cNvCxnSpPr>
-            <a:stCxn id="89" idx="3"/>
-            <a:endCxn id="88" idx="1"/>
-          </p:cNvCxnSpPr>
-          <p:nvPr/>
-        </p:nvCxnSpPr>
-        <p:spPr>
-          <a:xfrm>
-            <a:off x="4152150" y="1426475"/>
-            <a:ext cx="1329600" cy="2100"/>
-          </a:xfrm>
-          <a:prstGeom prst="straightConnector1">
-            <a:avLst/>
-          </a:prstGeom>
-          <a:noFill/>
-          <a:ln w="28575" cap="flat" cmpd="sng">
-            <a:solidFill>
-              <a:schemeClr val="dk2"/>
-            </a:solidFill>
-            <a:prstDash val="solid"/>
-            <a:round/>
-            <a:headEnd type="none" w="lg" len="lg"/>
-            <a:tailEnd type="triangle" w="lg" len="lg"/>
-          </a:ln>
-        </p:spPr>
-      </p:cxnSp>
-      <p:sp>
-        <p:nvSpPr>
-          <p:cNvPr id="91" name="Shape 91"/>
-          <p:cNvSpPr txBox="1"/>
-          <p:nvPr/>
-        </p:nvSpPr>
-        <p:spPr>
-          <a:xfrm>
-            <a:off x="524850" y="2261050"/>
-            <a:ext cx="7722000" cy="647400"/>
-          </a:xfrm>
-          <a:prstGeom prst="rect">
-            <a:avLst/>
-          </a:prstGeom>
-          <a:noFill/>
-          <a:ln w="19050" cap="flat" cmpd="sng">
-            <a:solidFill>
-              <a:srgbClr val="000000"/>
-            </a:solidFill>
-            <a:prstDash val="solid"/>
-            <a:round/>
-            <a:headEnd type="none" w="med" len="med"/>
-            <a:tailEnd type="none" w="med" len="med"/>
-          </a:ln>
-        </p:spPr>
-        <p:txBody>
-          <a:bodyPr lIns="91425" tIns="91425" rIns="91425" bIns="91425" anchor="ctr" anchorCtr="0">
-            <a:noAutofit/>
-          </a:bodyPr>
-          <a:lstStyle/>
-          <a:p>
-            <a:pPr lvl="0" algn="ctr" rtl="0">
-              <a:spcBef>
-                <a:spcPts val="0"/>
-              </a:spcBef>
-              <a:buNone/>
-            </a:pPr>
-            <a:r>
-              <a:rPr lang="en-GB" sz="1800" b="1"/>
-              <a:t>Hibernate OGM Core</a:t>
-            </a:r>
-          </a:p>
-          <a:p>
-            <a:pPr lvl="0" rtl="0">
-              <a:spcBef>
-                <a:spcPts val="0"/>
-              </a:spcBef>
-              <a:buNone/>
-            </a:pPr>
-            <a:endParaRPr/>
-          </a:p>
-        </p:txBody>
-      </p:sp>
-      <p:cxnSp>
-        <p:nvCxnSpPr>
-          <p:cNvPr id="92" name="Shape 92"/>
-          <p:cNvCxnSpPr>
-            <a:stCxn id="88" idx="2"/>
-            <a:endCxn id="91" idx="0"/>
-          </p:cNvCxnSpPr>
-          <p:nvPr/>
-        </p:nvCxnSpPr>
-        <p:spPr>
-          <a:xfrm rot="5400000">
-            <a:off x="5370725" y="767598"/>
-            <a:ext cx="508800" cy="2478300"/>
-          </a:xfrm>
-          <a:prstGeom prst="bentConnector3">
-            <a:avLst>
-              <a:gd name="adj1" fmla="val 35235"/>
-            </a:avLst>
-          </a:prstGeom>
-          <a:noFill/>
-          <a:ln w="28575" cap="flat" cmpd="sng">
-            <a:solidFill>
-              <a:schemeClr val="dk2"/>
-            </a:solidFill>
-            <a:prstDash val="solid"/>
-            <a:round/>
-            <a:headEnd type="none" w="lg" len="lg"/>
-            <a:tailEnd type="triangle" w="lg" len="lg"/>
-          </a:ln>
-        </p:spPr>
-      </p:cxnSp>
-      <p:sp>
-        <p:nvSpPr>
-          <p:cNvPr id="93" name="Shape 93"/>
-          <p:cNvSpPr txBox="1"/>
-          <p:nvPr/>
-        </p:nvSpPr>
-        <p:spPr>
-          <a:xfrm>
-            <a:off x="4502025" y="4017952"/>
-            <a:ext cx="3627300" cy="502800"/>
-          </a:xfrm>
-          <a:prstGeom prst="rect">
-            <a:avLst/>
-          </a:prstGeom>
-          <a:noFill/>
-          <a:ln w="19050" cap="flat" cmpd="sng">
-            <a:solidFill>
-              <a:srgbClr val="000000"/>
-            </a:solidFill>
-            <a:prstDash val="solid"/>
-            <a:round/>
-            <a:headEnd type="none" w="med" len="med"/>
-            <a:tailEnd type="none" w="med" len="med"/>
-          </a:ln>
-        </p:spPr>
-        <p:txBody>
-          <a:bodyPr lIns="91425" tIns="91425" rIns="91425" bIns="91425" anchor="ctr" anchorCtr="0">
-            <a:noAutofit/>
-          </a:bodyPr>
-          <a:lstStyle/>
-          <a:p>
-            <a:pPr lvl="0" algn="ctr" rtl="0">
-              <a:spcBef>
-                <a:spcPts val="0"/>
-              </a:spcBef>
-              <a:buNone/>
-            </a:pPr>
-            <a:r>
-              <a:rPr lang="en-GB" sz="1800" b="1"/>
-              <a:t>DatastorageProvider</a:t>
-            </a:r>
-          </a:p>
-          <a:p>
-            <a:pPr lvl="0" rtl="0">
-              <a:spcBef>
-                <a:spcPts val="0"/>
-              </a:spcBef>
-              <a:buNone/>
-            </a:pPr>
-            <a:endParaRPr/>
-          </a:p>
-        </p:txBody>
-      </p:sp>
-      <p:sp>
-        <p:nvSpPr>
-          <p:cNvPr id="94" name="Shape 94"/>
-          <p:cNvSpPr txBox="1"/>
-          <p:nvPr/>
-        </p:nvSpPr>
-        <p:spPr>
-          <a:xfrm>
-            <a:off x="621235" y="4014950"/>
-            <a:ext cx="3486600" cy="502800"/>
-          </a:xfrm>
-          <a:prstGeom prst="rect">
-            <a:avLst/>
-          </a:prstGeom>
-          <a:noFill/>
-          <a:ln w="19050" cap="flat" cmpd="sng">
-            <a:solidFill>
-              <a:srgbClr val="000000"/>
-            </a:solidFill>
-            <a:prstDash val="solid"/>
-            <a:round/>
-            <a:headEnd type="none" w="med" len="med"/>
-            <a:tailEnd type="none" w="med" len="med"/>
-          </a:ln>
-        </p:spPr>
-        <p:txBody>
-          <a:bodyPr lIns="91425" tIns="91425" rIns="91425" bIns="91425" anchor="ctr" anchorCtr="0">
-            <a:noAutofit/>
-          </a:bodyPr>
-          <a:lstStyle/>
-          <a:p>
-            <a:pPr lvl="0" algn="ctr" rtl="0">
-              <a:spcBef>
-                <a:spcPts val="0"/>
-              </a:spcBef>
-              <a:buNone/>
-            </a:pPr>
-            <a:r>
-              <a:rPr lang="en-GB" sz="1800" b="1"/>
-              <a:t>GridDialect</a:t>
-            </a:r>
-          </a:p>
-          <a:p>
-            <a:pPr lvl="0" rtl="0">
-              <a:spcBef>
-                <a:spcPts val="0"/>
-              </a:spcBef>
-              <a:buNone/>
-            </a:pPr>
-            <a:endParaRPr/>
-          </a:p>
-        </p:txBody>
-      </p:sp>
-      <p:cxnSp>
-        <p:nvCxnSpPr>
-          <p:cNvPr id="95" name="Shape 95"/>
-          <p:cNvCxnSpPr/>
-          <p:nvPr/>
-        </p:nvCxnSpPr>
-        <p:spPr>
-          <a:xfrm>
-            <a:off x="7291473" y="2917175"/>
-            <a:ext cx="0" cy="688200"/>
-          </a:xfrm>
-          <a:prstGeom prst="straightConnector1">
-            <a:avLst/>
-          </a:prstGeom>
-          <a:noFill/>
-          <a:ln w="28575" cap="flat" cmpd="sng">
-            <a:solidFill>
-              <a:schemeClr val="dk2"/>
-            </a:solidFill>
-            <a:prstDash val="solid"/>
-            <a:round/>
-            <a:headEnd type="none" w="lg" len="lg"/>
-            <a:tailEnd type="triangle" w="lg" len="lg"/>
-          </a:ln>
-        </p:spPr>
-      </p:cxnSp>
-      <p:sp>
-        <p:nvSpPr>
-          <p:cNvPr id="96" name="Shape 96"/>
-          <p:cNvSpPr txBox="1"/>
-          <p:nvPr/>
-        </p:nvSpPr>
-        <p:spPr>
-          <a:xfrm>
-            <a:off x="7297103" y="3055050"/>
-            <a:ext cx="933600" cy="326400"/>
-          </a:xfrm>
-          <a:prstGeom prst="rect">
-            <a:avLst/>
-          </a:prstGeom>
-          <a:noFill/>
-          <a:ln>
-            <a:noFill/>
-          </a:ln>
-        </p:spPr>
-        <p:txBody>
-          <a:bodyPr lIns="91425" tIns="91425" rIns="91425" bIns="91425" anchor="t" anchorCtr="0">
-            <a:noAutofit/>
-          </a:bodyPr>
-          <a:lstStyle/>
-          <a:p>
-            <a:pPr lvl="0" algn="ctr">
-              <a:spcBef>
-                <a:spcPts val="0"/>
-              </a:spcBef>
-              <a:buNone/>
-            </a:pPr>
-            <a:r>
-              <a:rPr lang="en-GB"/>
-              <a:t>1.begin()</a:t>
-            </a:r>
-          </a:p>
-        </p:txBody>
-      </p:sp>
-      <p:sp>
-        <p:nvSpPr>
-          <p:cNvPr id="97" name="Shape 97"/>
-          <p:cNvSpPr txBox="1"/>
-          <p:nvPr/>
-        </p:nvSpPr>
-        <p:spPr>
-          <a:xfrm>
-            <a:off x="572095" y="3102437"/>
-            <a:ext cx="1166399" cy="326400"/>
-          </a:xfrm>
-          <a:prstGeom prst="rect">
-            <a:avLst/>
-          </a:prstGeom>
-          <a:noFill/>
-          <a:ln>
-            <a:noFill/>
-          </a:ln>
-        </p:spPr>
-        <p:txBody>
-          <a:bodyPr lIns="91425" tIns="91425" rIns="91425" bIns="91425" anchor="t" anchorCtr="0">
-            <a:noAutofit/>
-          </a:bodyPr>
-          <a:lstStyle/>
-          <a:p>
-            <a:pPr lvl="0" algn="ctr" rtl="0">
-              <a:spcBef>
-                <a:spcPts val="0"/>
-              </a:spcBef>
-              <a:buNone/>
-            </a:pPr>
-            <a:r>
-              <a:rPr lang="en-GB"/>
-              <a:t>4.commit()</a:t>
-            </a:r>
-          </a:p>
-        </p:txBody>
-      </p:sp>
-      <p:sp>
-        <p:nvSpPr>
-          <p:cNvPr id="98" name="Shape 98"/>
-          <p:cNvSpPr txBox="1"/>
-          <p:nvPr/>
-        </p:nvSpPr>
-        <p:spPr>
-          <a:xfrm>
-            <a:off x="5028994" y="3102450"/>
-            <a:ext cx="1449300" cy="326400"/>
-          </a:xfrm>
-          <a:prstGeom prst="rect">
-            <a:avLst/>
-          </a:prstGeom>
-          <a:noFill/>
-          <a:ln>
-            <a:noFill/>
-          </a:ln>
-        </p:spPr>
-        <p:txBody>
-          <a:bodyPr lIns="91425" tIns="91425" rIns="91425" bIns="91425" anchor="t" anchorCtr="0">
-            <a:noAutofit/>
-          </a:bodyPr>
-          <a:lstStyle/>
-          <a:p>
-            <a:pPr lvl="0" algn="ctr" rtl="0">
-              <a:spcBef>
-                <a:spcPts val="0"/>
-              </a:spcBef>
-              <a:buNone/>
-            </a:pPr>
-            <a:r>
-              <a:rPr lang="en-GB"/>
-              <a:t>2.createTuple()</a:t>
-            </a:r>
-          </a:p>
-        </p:txBody>
-      </p:sp>
-      <p:sp>
-        <p:nvSpPr>
-          <p:cNvPr id="99" name="Shape 99"/>
-          <p:cNvSpPr txBox="1"/>
-          <p:nvPr/>
-        </p:nvSpPr>
-        <p:spPr>
-          <a:xfrm>
-            <a:off x="2460783" y="3102450"/>
-            <a:ext cx="1354499" cy="326400"/>
-          </a:xfrm>
-          <a:prstGeom prst="rect">
-            <a:avLst/>
-          </a:prstGeom>
-          <a:noFill/>
-          <a:ln>
-            <a:noFill/>
-          </a:ln>
-        </p:spPr>
-        <p:txBody>
-          <a:bodyPr lIns="91425" tIns="91425" rIns="91425" bIns="91425" anchor="t" anchorCtr="0">
-            <a:noAutofit/>
-          </a:bodyPr>
-          <a:lstStyle/>
-          <a:p>
-            <a:pPr lvl="0" algn="ctr" rtl="0">
-              <a:spcBef>
-                <a:spcPts val="0"/>
-              </a:spcBef>
-              <a:buNone/>
-            </a:pPr>
-            <a:r>
-              <a:rPr lang="en-GB"/>
-              <a:t>3.insertTuple()</a:t>
-            </a:r>
-          </a:p>
-        </p:txBody>
-      </p:sp>
-      <p:sp>
-        <p:nvSpPr>
-          <p:cNvPr id="100" name="Shape 100"/>
+          <p:cNvPr id="80" name="Shape 80"/>
           <p:cNvSpPr txBox="1">
             <a:spLocks noGrp="1"/>
           </p:cNvSpPr>
@@ -6145,85 +5931,203 @@
           </a:p>
         </p:txBody>
       </p:sp>
-      <p:cxnSp>
-        <p:nvCxnSpPr>
-          <p:cNvPr id="101" name="Shape 101"/>
-          <p:cNvCxnSpPr/>
+      <p:sp>
+        <p:nvSpPr>
+          <p:cNvPr id="81" name="Shape 81"/>
+          <p:cNvSpPr txBox="1"/>
           <p:nvPr/>
-        </p:nvCxnSpPr>
-        <p:spPr>
-          <a:xfrm>
-            <a:off x="553170" y="2901145"/>
-            <a:ext cx="0" cy="688199"/>
-          </a:xfrm>
-          <a:prstGeom prst="straightConnector1">
+        </p:nvSpPr>
+        <p:spPr>
+          <a:xfrm>
+            <a:off x="524850" y="431550"/>
+            <a:ext cx="8117700" cy="4150724"/>
+          </a:xfrm>
+          <a:prstGeom prst="rect">
             <a:avLst/>
           </a:prstGeom>
           <a:noFill/>
-          <a:ln w="28575" cap="flat" cmpd="sng">
-            <a:solidFill>
-              <a:schemeClr val="dk2"/>
-            </a:solidFill>
-            <a:prstDash val="solid"/>
-            <a:round/>
-            <a:headEnd type="none" w="lg" len="lg"/>
-            <a:tailEnd type="triangle" w="lg" len="lg"/>
+          <a:ln>
+            <a:noFill/>
           </a:ln>
         </p:spPr>
-      </p:cxnSp>
-      <p:cxnSp>
-        <p:nvCxnSpPr>
-          <p:cNvPr id="102" name="Shape 102"/>
-          <p:cNvCxnSpPr/>
-          <p:nvPr/>
-        </p:nvCxnSpPr>
-        <p:spPr>
-          <a:xfrm>
-            <a:off x="5040719" y="2921537"/>
-            <a:ext cx="0" cy="688200"/>
-          </a:xfrm>
-          <a:prstGeom prst="straightConnector1">
-            <a:avLst/>
-          </a:prstGeom>
-          <a:noFill/>
-          <a:ln w="28575" cap="flat" cmpd="sng">
-            <a:solidFill>
-              <a:schemeClr val="dk2"/>
-            </a:solidFill>
-            <a:prstDash val="solid"/>
-            <a:round/>
-            <a:headEnd type="triangle" w="lg" len="lg"/>
-            <a:tailEnd type="triangle" w="lg" len="lg"/>
-          </a:ln>
-        </p:spPr>
-      </p:cxnSp>
-      <p:cxnSp>
-        <p:nvCxnSpPr>
-          <p:cNvPr id="103" name="Shape 103"/>
-          <p:cNvCxnSpPr/>
-          <p:nvPr/>
-        </p:nvCxnSpPr>
-        <p:spPr>
-          <a:xfrm>
-            <a:off x="2495070" y="2919394"/>
-            <a:ext cx="0" cy="688200"/>
-          </a:xfrm>
-          <a:prstGeom prst="straightConnector1">
-            <a:avLst/>
-          </a:prstGeom>
-          <a:noFill/>
-          <a:ln w="28575" cap="flat" cmpd="sng">
-            <a:solidFill>
-              <a:schemeClr val="dk2"/>
-            </a:solidFill>
-            <a:prstDash val="solid"/>
-            <a:round/>
-            <a:headEnd type="triangle" w="lg" len="lg"/>
-            <a:tailEnd type="triangle" w="lg" len="lg"/>
-          </a:ln>
-        </p:spPr>
-      </p:cxnSp>
+        <p:txBody>
+          <a:bodyPr lIns="91425" tIns="91425" rIns="91425" bIns="91425" numCol="1" anchor="t" anchorCtr="0">
+            <a:noAutofit/>
+          </a:bodyPr>
+          <a:lstStyle/>
+          <a:p>
+            <a:pPr marL="558800" lvl="1" indent="-457200">
+              <a:lnSpc>
+                <a:spcPct val="200000"/>
+              </a:lnSpc>
+              <a:buSzPct val="100000"/>
+              <a:buFont typeface="+mj-lt"/>
+              <a:buAutoNum type="arabicPeriod" startAt="4"/>
+            </a:pPr>
+            <a:r>
+              <a:rPr lang="en-GB" sz="2000" b="1" dirty="0"/>
+              <a:t>Supported </a:t>
+            </a:r>
+            <a:r>
+              <a:rPr lang="en-GB" sz="2000" b="1" dirty="0" smtClean="0"/>
+              <a:t>storages</a:t>
+            </a:r>
+            <a:endParaRPr lang="en-GB" sz="2000" b="1" dirty="0"/>
+          </a:p>
+          <a:p>
+            <a:pPr marL="914400" lvl="2" indent="-342900">
+              <a:lnSpc>
+                <a:spcPct val="150000"/>
+              </a:lnSpc>
+              <a:buSzPct val="100000"/>
+              <a:buFontTx/>
+              <a:buAutoNum type="arabicPeriod"/>
+            </a:pPr>
+            <a:r>
+              <a:rPr lang="en-GB" sz="1800" b="1" dirty="0" err="1" smtClean="0"/>
+              <a:t>Infispinian</a:t>
+            </a:r>
+            <a:r>
+              <a:rPr lang="en-GB" sz="1800" b="1" dirty="0" smtClean="0"/>
+              <a:t>, </a:t>
+            </a:r>
+            <a:r>
+              <a:rPr lang="en-GB" sz="1800" b="1" dirty="0" err="1" smtClean="0"/>
+              <a:t>Ehcache</a:t>
+            </a:r>
+            <a:r>
+              <a:rPr lang="en-GB" sz="1800" b="1" dirty="0" smtClean="0"/>
+              <a:t>,</a:t>
+            </a:r>
+            <a:r>
+              <a:rPr lang="en-GB" sz="1800" b="1" dirty="0"/>
+              <a:t> </a:t>
+            </a:r>
+            <a:r>
+              <a:rPr lang="en-GB" sz="1800" b="1" dirty="0" err="1"/>
+              <a:t>Redis</a:t>
+            </a:r>
+            <a:r>
+              <a:rPr lang="en-GB" sz="1800" b="1" dirty="0"/>
+              <a:t>(Experimental)</a:t>
+            </a:r>
+          </a:p>
+          <a:p>
+            <a:pPr marL="914400" lvl="2" indent="-342900">
+              <a:lnSpc>
+                <a:spcPct val="150000"/>
+              </a:lnSpc>
+              <a:buSzPct val="100000"/>
+              <a:buFontTx/>
+              <a:buAutoNum type="arabicPeriod"/>
+            </a:pPr>
+            <a:r>
+              <a:rPr lang="en-GB" sz="1800" b="1" dirty="0" smtClean="0"/>
+              <a:t>MongoDB</a:t>
+            </a:r>
+            <a:r>
+              <a:rPr lang="en-GB" sz="1800" b="1" dirty="0"/>
+              <a:t>, </a:t>
+            </a:r>
+            <a:r>
+              <a:rPr lang="en-GB" sz="1800" b="1" dirty="0" err="1" smtClean="0"/>
+              <a:t>CouchDB</a:t>
+            </a:r>
+            <a:r>
+              <a:rPr lang="en-GB" sz="1800" b="1" dirty="0" smtClean="0"/>
+              <a:t>(Experimental</a:t>
+            </a:r>
+            <a:r>
+              <a:rPr lang="en-GB" sz="1800" b="1" dirty="0"/>
+              <a:t>)</a:t>
+            </a:r>
+          </a:p>
+          <a:p>
+            <a:pPr marL="914400" lvl="2" indent="-342900">
+              <a:lnSpc>
+                <a:spcPct val="150000"/>
+              </a:lnSpc>
+              <a:buSzPct val="100000"/>
+              <a:buAutoNum type="arabicPeriod"/>
+            </a:pPr>
+            <a:r>
+              <a:rPr lang="en-GB" sz="1800" b="1" dirty="0" smtClean="0"/>
+              <a:t>Neo4j</a:t>
+            </a:r>
+          </a:p>
+          <a:p>
+            <a:pPr marL="914400" lvl="2" indent="-342900">
+              <a:lnSpc>
+                <a:spcPct val="150000"/>
+              </a:lnSpc>
+              <a:buSzPct val="100000"/>
+              <a:buAutoNum type="arabicPeriod"/>
+            </a:pPr>
+            <a:r>
+              <a:rPr lang="en-GB" sz="1800" b="1" dirty="0" smtClean="0"/>
+              <a:t>Cassandra(experimental)</a:t>
+            </a:r>
+          </a:p>
+          <a:p>
+            <a:pPr marL="914400" lvl="2" indent="-342900">
+              <a:lnSpc>
+                <a:spcPct val="150000"/>
+              </a:lnSpc>
+              <a:buSzPct val="100000"/>
+              <a:buAutoNum type="arabicPeriod"/>
+            </a:pPr>
+            <a:r>
+              <a:rPr lang="en-GB" sz="1800" i="1" dirty="0" err="1" smtClean="0"/>
+              <a:t>OrientDB</a:t>
+            </a:r>
+            <a:r>
+              <a:rPr lang="ru-RU" sz="1800" i="1" dirty="0" smtClean="0"/>
+              <a:t> (</a:t>
+            </a:r>
+            <a:r>
+              <a:rPr lang="en-US" sz="1800" i="1" dirty="0"/>
+              <a:t>preparing to release</a:t>
+            </a:r>
+            <a:r>
+              <a:rPr lang="ru-RU" sz="1800" i="1" dirty="0" smtClean="0"/>
+              <a:t>)</a:t>
+            </a:r>
+            <a:endParaRPr lang="en-GB" sz="1800" i="1" dirty="0" smtClean="0"/>
+          </a:p>
+          <a:p>
+            <a:pPr marL="914400" lvl="2" indent="-342900">
+              <a:lnSpc>
+                <a:spcPct val="150000"/>
+              </a:lnSpc>
+              <a:buSzPct val="100000"/>
+              <a:buAutoNum type="arabicPeriod"/>
+            </a:pPr>
+            <a:r>
+              <a:rPr lang="en-GB" sz="1800" i="1" dirty="0" smtClean="0"/>
+              <a:t>Apache Ignite</a:t>
+            </a:r>
+            <a:r>
+              <a:rPr lang="ru-RU" sz="1800" i="1" dirty="0" smtClean="0"/>
+              <a:t> (</a:t>
+            </a:r>
+            <a:r>
+              <a:rPr lang="en-US" sz="1800" i="1" dirty="0"/>
+              <a:t>preparing to release</a:t>
+            </a:r>
+            <a:r>
+              <a:rPr lang="ru-RU" sz="1800" i="1" dirty="0" smtClean="0"/>
+              <a:t>)</a:t>
+            </a:r>
+            <a:endParaRPr lang="en-GB" sz="1800" i="1" dirty="0"/>
+          </a:p>
+        </p:txBody>
+      </p:sp>
     </p:spTree>
+    <p:extLst>
+      <p:ext uri="{BB962C8B-B14F-4D97-AF65-F5344CB8AC3E}">
+        <p14:creationId xmlns:p14="http://schemas.microsoft.com/office/powerpoint/2010/main" val="985386761"/>
+      </p:ext>
+    </p:extLst>
   </p:cSld>
   <p:clrMapOvr>
     <a:masterClrMapping/>
@@ -6243,7 +6147,7 @@
   <p:cSld>
     <p:spTree>
       <p:nvGrpSpPr>
-        <p:cNvPr id="1" name="Shape 107"/>
+        <p:cNvPr id="1" name="Shape 79"/>
         <p:cNvGrpSpPr/>
         <p:nvPr/>
       </p:nvGrpSpPr>
@@ -6257,45 +6161,7 @@
       </p:grpSpPr>
       <p:sp>
         <p:nvSpPr>
-          <p:cNvPr id="108" name="Shape 108"/>
-          <p:cNvSpPr txBox="1"/>
-          <p:nvPr/>
-        </p:nvSpPr>
-        <p:spPr>
-          <a:xfrm>
-            <a:off x="3738150" y="2181000"/>
-            <a:ext cx="1667700" cy="781500"/>
-          </a:xfrm>
-          <a:prstGeom prst="rect">
-            <a:avLst/>
-          </a:prstGeom>
-          <a:noFill/>
-          <a:ln>
-            <a:noFill/>
-          </a:ln>
-        </p:spPr>
-        <p:txBody>
-          <a:bodyPr lIns="91425" tIns="91425" rIns="91425" bIns="91425" anchor="t" anchorCtr="0">
-            <a:noAutofit/>
-          </a:bodyPr>
-          <a:lstStyle/>
-          <a:p>
-            <a:pPr lvl="0">
-              <a:spcBef>
-                <a:spcPts val="0"/>
-              </a:spcBef>
-              <a:buNone/>
-            </a:pPr>
-            <a:r>
-              <a:rPr lang="en-GB" sz="4800" b="1"/>
-              <a:t>Q&amp;A</a:t>
-            </a:r>
-          </a:p>
-        </p:txBody>
-      </p:sp>
-      <p:sp>
-        <p:nvSpPr>
-          <p:cNvPr id="109" name="Shape 109"/>
+          <p:cNvPr id="80" name="Shape 80"/>
           <p:cNvSpPr txBox="1">
             <a:spLocks noGrp="1"/>
           </p:cNvSpPr>
@@ -6332,7 +6198,1146 @@
           </a:p>
         </p:txBody>
       </p:sp>
+      <p:sp>
+        <p:nvSpPr>
+          <p:cNvPr id="81" name="Shape 81"/>
+          <p:cNvSpPr txBox="1"/>
+          <p:nvPr/>
+        </p:nvSpPr>
+        <p:spPr>
+          <a:xfrm>
+            <a:off x="524850" y="431550"/>
+            <a:ext cx="8117700" cy="4150724"/>
+          </a:xfrm>
+          <a:prstGeom prst="rect">
+            <a:avLst/>
+          </a:prstGeom>
+          <a:noFill/>
+          <a:ln>
+            <a:noFill/>
+          </a:ln>
+        </p:spPr>
+        <p:txBody>
+          <a:bodyPr lIns="91425" tIns="91425" rIns="91425" bIns="91425" numCol="1" anchor="t" anchorCtr="0">
+            <a:noAutofit/>
+          </a:bodyPr>
+          <a:lstStyle/>
+          <a:p>
+            <a:pPr marL="558800" lvl="1" indent="-457200">
+              <a:lnSpc>
+                <a:spcPct val="200000"/>
+              </a:lnSpc>
+              <a:buSzPct val="100000"/>
+              <a:buFont typeface="+mj-lt"/>
+              <a:buAutoNum type="arabicPeriod" startAt="5"/>
+            </a:pPr>
+            <a:r>
+              <a:rPr lang="en-GB" sz="2000" b="1" dirty="0"/>
+              <a:t>Supported </a:t>
+            </a:r>
+            <a:r>
+              <a:rPr lang="en-GB" sz="2000" b="1" dirty="0" smtClean="0"/>
+              <a:t>features</a:t>
+            </a:r>
+            <a:endParaRPr lang="en-GB" sz="2000" b="1" dirty="0"/>
+          </a:p>
+        </p:txBody>
+      </p:sp>
+      <p:graphicFrame>
+        <p:nvGraphicFramePr>
+          <p:cNvPr id="2" name="Таблица 1"/>
+          <p:cNvGraphicFramePr>
+            <a:graphicFrameLocks noGrp="1"/>
+          </p:cNvGraphicFramePr>
+          <p:nvPr>
+            <p:extLst>
+              <p:ext uri="{D42A27DB-BD31-4B8C-83A1-F6EECF244321}">
+                <p14:modId xmlns:p14="http://schemas.microsoft.com/office/powerpoint/2010/main" val="2480743764"/>
+              </p:ext>
+            </p:extLst>
+          </p:nvPr>
+        </p:nvGraphicFramePr>
+        <p:xfrm>
+          <a:off x="650697" y="1166475"/>
+          <a:ext cx="7821760" cy="1112520"/>
+        </p:xfrm>
+        <a:graphic>
+          <a:graphicData uri="http://schemas.openxmlformats.org/drawingml/2006/table">
+            <a:tbl>
+              <a:tblPr firstRow="1" bandRow="1">
+                <a:tableStyleId>{21E4AEA4-8DFA-4A89-87EB-49C32662AFE0}</a:tableStyleId>
+              </a:tblPr>
+              <a:tblGrid>
+                <a:gridCol w="1955440"/>
+                <a:gridCol w="1955440"/>
+                <a:gridCol w="1955440"/>
+                <a:gridCol w="1955440"/>
+              </a:tblGrid>
+              <a:tr h="370840">
+                <a:tc>
+                  <a:txBody>
+                    <a:bodyPr/>
+                    <a:lstStyle/>
+                    <a:p>
+                      <a:r>
+                        <a:rPr lang="en-US" dirty="0" err="1" smtClean="0"/>
+                        <a:t>Datastorage</a:t>
+                      </a:r>
+                      <a:endParaRPr lang="ru-RU" dirty="0"/>
+                    </a:p>
+                  </a:txBody>
+                  <a:tcPr/>
+                </a:tc>
+                <a:tc>
+                  <a:txBody>
+                    <a:bodyPr/>
+                    <a:lstStyle/>
+                    <a:p>
+                      <a:endParaRPr lang="ru-RU"/>
+                    </a:p>
+                  </a:txBody>
+                  <a:tcPr/>
+                </a:tc>
+                <a:tc>
+                  <a:txBody>
+                    <a:bodyPr/>
+                    <a:lstStyle/>
+                    <a:p>
+                      <a:endParaRPr lang="ru-RU"/>
+                    </a:p>
+                  </a:txBody>
+                  <a:tcPr/>
+                </a:tc>
+                <a:tc>
+                  <a:txBody>
+                    <a:bodyPr/>
+                    <a:lstStyle/>
+                    <a:p>
+                      <a:endParaRPr lang="ru-RU"/>
+                    </a:p>
+                  </a:txBody>
+                  <a:tcPr/>
+                </a:tc>
+              </a:tr>
+              <a:tr h="370840">
+                <a:tc>
+                  <a:txBody>
+                    <a:bodyPr/>
+                    <a:lstStyle/>
+                    <a:p>
+                      <a:endParaRPr lang="ru-RU"/>
+                    </a:p>
+                  </a:txBody>
+                  <a:tcPr/>
+                </a:tc>
+                <a:tc>
+                  <a:txBody>
+                    <a:bodyPr/>
+                    <a:lstStyle/>
+                    <a:p>
+                      <a:endParaRPr lang="ru-RU"/>
+                    </a:p>
+                  </a:txBody>
+                  <a:tcPr/>
+                </a:tc>
+                <a:tc>
+                  <a:txBody>
+                    <a:bodyPr/>
+                    <a:lstStyle/>
+                    <a:p>
+                      <a:endParaRPr lang="ru-RU"/>
+                    </a:p>
+                  </a:txBody>
+                  <a:tcPr/>
+                </a:tc>
+                <a:tc>
+                  <a:txBody>
+                    <a:bodyPr/>
+                    <a:lstStyle/>
+                    <a:p>
+                      <a:endParaRPr lang="ru-RU"/>
+                    </a:p>
+                  </a:txBody>
+                  <a:tcPr/>
+                </a:tc>
+              </a:tr>
+              <a:tr h="370840">
+                <a:tc>
+                  <a:txBody>
+                    <a:bodyPr/>
+                    <a:lstStyle/>
+                    <a:p>
+                      <a:endParaRPr lang="ru-RU"/>
+                    </a:p>
+                  </a:txBody>
+                  <a:tcPr/>
+                </a:tc>
+                <a:tc>
+                  <a:txBody>
+                    <a:bodyPr/>
+                    <a:lstStyle/>
+                    <a:p>
+                      <a:endParaRPr lang="ru-RU"/>
+                    </a:p>
+                  </a:txBody>
+                  <a:tcPr/>
+                </a:tc>
+                <a:tc>
+                  <a:txBody>
+                    <a:bodyPr/>
+                    <a:lstStyle/>
+                    <a:p>
+                      <a:endParaRPr lang="ru-RU"/>
+                    </a:p>
+                  </a:txBody>
+                  <a:tcPr/>
+                </a:tc>
+                <a:tc>
+                  <a:txBody>
+                    <a:bodyPr/>
+                    <a:lstStyle/>
+                    <a:p>
+                      <a:endParaRPr lang="ru-RU" dirty="0"/>
+                    </a:p>
+                  </a:txBody>
+                  <a:tcPr/>
+                </a:tc>
+              </a:tr>
+            </a:tbl>
+          </a:graphicData>
+        </a:graphic>
+      </p:graphicFrame>
     </p:spTree>
+    <p:extLst>
+      <p:ext uri="{BB962C8B-B14F-4D97-AF65-F5344CB8AC3E}">
+        <p14:creationId xmlns:p14="http://schemas.microsoft.com/office/powerpoint/2010/main" val="4081336449"/>
+      </p:ext>
+    </p:extLst>
+  </p:cSld>
+  <p:clrMapOvr>
+    <a:masterClrMapping/>
+  </p:clrMapOvr>
+  <p:timing>
+    <p:tnLst>
+      <p:par>
+        <p:cTn id="1" dur="indefinite" restart="never" nodeType="tmRoot"/>
+      </p:par>
+    </p:tnLst>
+  </p:timing>
+</p:sld>
+</file>
+
+<file path=ppt/slides/slide8.xml><?xml version="1.0" encoding="utf-8"?>
+<p:sld xmlns:a="http://schemas.openxmlformats.org/drawingml/2006/main" xmlns:r="http://schemas.openxmlformats.org/officeDocument/2006/relationships" xmlns:p="http://schemas.openxmlformats.org/presentationml/2006/main">
+  <p:cSld>
+    <p:spTree>
+      <p:nvGrpSpPr>
+        <p:cNvPr id="1" name="Shape 85"/>
+        <p:cNvGrpSpPr/>
+        <p:nvPr/>
+      </p:nvGrpSpPr>
+      <p:grpSpPr>
+        <a:xfrm>
+          <a:off x="0" y="0"/>
+          <a:ext cx="0" cy="0"/>
+          <a:chOff x="0" y="0"/>
+          <a:chExt cx="0" cy="0"/>
+        </a:xfrm>
+      </p:grpSpPr>
+      <p:sp>
+        <p:nvSpPr>
+          <p:cNvPr id="86" name="Shape 86"/>
+          <p:cNvSpPr txBox="1"/>
+          <p:nvPr/>
+        </p:nvSpPr>
+        <p:spPr>
+          <a:xfrm>
+            <a:off x="524650" y="3622825"/>
+            <a:ext cx="7722000" cy="1032600"/>
+          </a:xfrm>
+          <a:prstGeom prst="rect">
+            <a:avLst/>
+          </a:prstGeom>
+          <a:noFill/>
+          <a:ln w="19050" cap="flat" cmpd="sng">
+            <a:solidFill>
+              <a:srgbClr val="000000"/>
+            </a:solidFill>
+            <a:prstDash val="dot"/>
+            <a:round/>
+            <a:headEnd type="none" w="med" len="med"/>
+            <a:tailEnd type="none" w="med" len="med"/>
+          </a:ln>
+        </p:spPr>
+        <p:txBody>
+          <a:bodyPr lIns="91425" tIns="91425" rIns="91425" bIns="91425" anchor="t" anchorCtr="0">
+            <a:noAutofit/>
+          </a:bodyPr>
+          <a:lstStyle/>
+          <a:p>
+            <a:pPr lvl="0" algn="ctr" rtl="0">
+              <a:spcBef>
+                <a:spcPts val="0"/>
+              </a:spcBef>
+              <a:buNone/>
+            </a:pPr>
+            <a:r>
+              <a:rPr lang="en-GB" b="1"/>
+              <a:t>Hibernate OGM Module for Concrete Storage </a:t>
+            </a:r>
+          </a:p>
+          <a:p>
+            <a:pPr lvl="0" rtl="0">
+              <a:spcBef>
+                <a:spcPts val="0"/>
+              </a:spcBef>
+              <a:buNone/>
+            </a:pPr>
+            <a:endParaRPr/>
+          </a:p>
+        </p:txBody>
+      </p:sp>
+      <p:sp>
+        <p:nvSpPr>
+          <p:cNvPr id="87" name="Shape 87"/>
+          <p:cNvSpPr txBox="1"/>
+          <p:nvPr/>
+        </p:nvSpPr>
+        <p:spPr>
+          <a:xfrm>
+            <a:off x="524850" y="431550"/>
+            <a:ext cx="8117700" cy="559800"/>
+          </a:xfrm>
+          <a:prstGeom prst="rect">
+            <a:avLst/>
+          </a:prstGeom>
+          <a:noFill/>
+          <a:ln>
+            <a:noFill/>
+          </a:ln>
+        </p:spPr>
+        <p:txBody>
+          <a:bodyPr lIns="91425" tIns="91425" rIns="91425" bIns="91425" anchor="t" anchorCtr="0">
+            <a:noAutofit/>
+          </a:bodyPr>
+          <a:lstStyle/>
+          <a:p>
+            <a:pPr marL="558800" lvl="0" indent="-457200" rtl="0">
+              <a:lnSpc>
+                <a:spcPct val="200000"/>
+              </a:lnSpc>
+              <a:spcBef>
+                <a:spcPts val="0"/>
+              </a:spcBef>
+              <a:buSzPct val="100000"/>
+              <a:buFont typeface="+mj-lt"/>
+              <a:buAutoNum type="arabicPeriod" startAt="6"/>
+            </a:pPr>
+            <a:r>
+              <a:rPr lang="en-GB" sz="2000" b="1" dirty="0"/>
+              <a:t>Architecture</a:t>
+            </a:r>
+          </a:p>
+          <a:p>
+            <a:pPr marL="457200" lvl="0" indent="0" rtl="0">
+              <a:lnSpc>
+                <a:spcPct val="150000"/>
+              </a:lnSpc>
+              <a:spcBef>
+                <a:spcPts val="0"/>
+              </a:spcBef>
+              <a:buNone/>
+            </a:pPr>
+            <a:endParaRPr sz="1800" b="1" dirty="0"/>
+          </a:p>
+        </p:txBody>
+      </p:sp>
+      <p:sp>
+        <p:nvSpPr>
+          <p:cNvPr id="88" name="Shape 88"/>
+          <p:cNvSpPr txBox="1"/>
+          <p:nvPr/>
+        </p:nvSpPr>
+        <p:spPr>
+          <a:xfrm>
+            <a:off x="5481725" y="1104948"/>
+            <a:ext cx="2765100" cy="647400"/>
+          </a:xfrm>
+          <a:prstGeom prst="rect">
+            <a:avLst/>
+          </a:prstGeom>
+          <a:noFill/>
+          <a:ln w="19050" cap="flat" cmpd="sng">
+            <a:solidFill>
+              <a:srgbClr val="000000"/>
+            </a:solidFill>
+            <a:prstDash val="solid"/>
+            <a:round/>
+            <a:headEnd type="none" w="med" len="med"/>
+            <a:tailEnd type="none" w="med" len="med"/>
+          </a:ln>
+        </p:spPr>
+        <p:txBody>
+          <a:bodyPr lIns="91425" tIns="91425" rIns="91425" bIns="91425" anchor="ctr" anchorCtr="0">
+            <a:noAutofit/>
+          </a:bodyPr>
+          <a:lstStyle/>
+          <a:p>
+            <a:pPr lvl="0" algn="ctr" rtl="0">
+              <a:spcBef>
+                <a:spcPts val="0"/>
+              </a:spcBef>
+              <a:buNone/>
+            </a:pPr>
+            <a:r>
+              <a:rPr lang="en-GB" sz="1800" b="1"/>
+              <a:t>Hibernate ORM Core</a:t>
+            </a:r>
+          </a:p>
+          <a:p>
+            <a:pPr lvl="0" rtl="0">
+              <a:spcBef>
+                <a:spcPts val="0"/>
+              </a:spcBef>
+              <a:buNone/>
+            </a:pPr>
+            <a:endParaRPr/>
+          </a:p>
+        </p:txBody>
+      </p:sp>
+      <p:sp>
+        <p:nvSpPr>
+          <p:cNvPr id="89" name="Shape 89"/>
+          <p:cNvSpPr txBox="1"/>
+          <p:nvPr/>
+        </p:nvSpPr>
+        <p:spPr>
+          <a:xfrm>
+            <a:off x="524850" y="1051025"/>
+            <a:ext cx="3627300" cy="750900"/>
+          </a:xfrm>
+          <a:prstGeom prst="rect">
+            <a:avLst/>
+          </a:prstGeom>
+          <a:noFill/>
+          <a:ln w="19050" cap="flat" cmpd="sng">
+            <a:solidFill>
+              <a:srgbClr val="000000"/>
+            </a:solidFill>
+            <a:prstDash val="solid"/>
+            <a:round/>
+            <a:headEnd type="none" w="med" len="med"/>
+            <a:tailEnd type="none" w="med" len="med"/>
+          </a:ln>
+        </p:spPr>
+        <p:txBody>
+          <a:bodyPr lIns="91425" tIns="91425" rIns="91425" bIns="91425" anchor="t" anchorCtr="0">
+            <a:noAutofit/>
+          </a:bodyPr>
+          <a:lstStyle/>
+          <a:p>
+            <a:pPr lvl="0">
+              <a:spcBef>
+                <a:spcPts val="0"/>
+              </a:spcBef>
+              <a:buClr>
+                <a:schemeClr val="dk1"/>
+              </a:buClr>
+              <a:buFont typeface="Arial"/>
+              <a:buNone/>
+            </a:pPr>
+            <a:r>
+              <a:rPr lang="en-GB"/>
+              <a:t>em.getTransaction().begin();</a:t>
+            </a:r>
+          </a:p>
+          <a:p>
+            <a:pPr lvl="0">
+              <a:spcBef>
+                <a:spcPts val="0"/>
+              </a:spcBef>
+              <a:buClr>
+                <a:schemeClr val="dk1"/>
+              </a:buClr>
+              <a:buFont typeface="Arial"/>
+              <a:buNone/>
+            </a:pPr>
+            <a:r>
+              <a:rPr lang="en-GB"/>
+              <a:t>em.persist(</a:t>
+            </a:r>
+            <a:r>
+              <a:rPr lang="en-GB">
+                <a:solidFill>
+                  <a:schemeClr val="dk1"/>
+                </a:solidFill>
+              </a:rPr>
+              <a:t>new Person("name1")</a:t>
+            </a:r>
+            <a:r>
+              <a:rPr lang="en-GB"/>
+              <a:t>);</a:t>
+            </a:r>
+          </a:p>
+          <a:p>
+            <a:pPr lvl="0">
+              <a:spcBef>
+                <a:spcPts val="0"/>
+              </a:spcBef>
+              <a:buClr>
+                <a:schemeClr val="dk1"/>
+              </a:buClr>
+              <a:buFont typeface="Arial"/>
+              <a:buNone/>
+            </a:pPr>
+            <a:r>
+              <a:rPr lang="en-GB"/>
+              <a:t>em.getTransaction().commit();</a:t>
+            </a:r>
+          </a:p>
+          <a:p>
+            <a:pPr lvl="0">
+              <a:spcBef>
+                <a:spcPts val="0"/>
+              </a:spcBef>
+              <a:buNone/>
+            </a:pPr>
+            <a:endParaRPr/>
+          </a:p>
+        </p:txBody>
+      </p:sp>
+      <p:cxnSp>
+        <p:nvCxnSpPr>
+          <p:cNvPr id="90" name="Shape 90"/>
+          <p:cNvCxnSpPr>
+            <a:stCxn id="89" idx="3"/>
+            <a:endCxn id="88" idx="1"/>
+          </p:cNvCxnSpPr>
+          <p:nvPr/>
+        </p:nvCxnSpPr>
+        <p:spPr>
+          <a:xfrm>
+            <a:off x="4152150" y="1426475"/>
+            <a:ext cx="1329600" cy="2100"/>
+          </a:xfrm>
+          <a:prstGeom prst="straightConnector1">
+            <a:avLst/>
+          </a:prstGeom>
+          <a:noFill/>
+          <a:ln w="28575" cap="flat" cmpd="sng">
+            <a:solidFill>
+              <a:schemeClr val="dk2"/>
+            </a:solidFill>
+            <a:prstDash val="solid"/>
+            <a:round/>
+            <a:headEnd type="none" w="lg" len="lg"/>
+            <a:tailEnd type="triangle" w="lg" len="lg"/>
+          </a:ln>
+        </p:spPr>
+      </p:cxnSp>
+      <p:sp>
+        <p:nvSpPr>
+          <p:cNvPr id="91" name="Shape 91"/>
+          <p:cNvSpPr txBox="1"/>
+          <p:nvPr/>
+        </p:nvSpPr>
+        <p:spPr>
+          <a:xfrm>
+            <a:off x="524850" y="2261050"/>
+            <a:ext cx="7722000" cy="647400"/>
+          </a:xfrm>
+          <a:prstGeom prst="rect">
+            <a:avLst/>
+          </a:prstGeom>
+          <a:noFill/>
+          <a:ln w="19050" cap="flat" cmpd="sng">
+            <a:solidFill>
+              <a:srgbClr val="000000"/>
+            </a:solidFill>
+            <a:prstDash val="solid"/>
+            <a:round/>
+            <a:headEnd type="none" w="med" len="med"/>
+            <a:tailEnd type="none" w="med" len="med"/>
+          </a:ln>
+        </p:spPr>
+        <p:txBody>
+          <a:bodyPr lIns="91425" tIns="91425" rIns="91425" bIns="91425" anchor="ctr" anchorCtr="0">
+            <a:noAutofit/>
+          </a:bodyPr>
+          <a:lstStyle/>
+          <a:p>
+            <a:pPr lvl="0" algn="ctr" rtl="0">
+              <a:spcBef>
+                <a:spcPts val="0"/>
+              </a:spcBef>
+              <a:buNone/>
+            </a:pPr>
+            <a:r>
+              <a:rPr lang="en-GB" sz="1800" b="1"/>
+              <a:t>Hibernate OGM Core</a:t>
+            </a:r>
+          </a:p>
+          <a:p>
+            <a:pPr lvl="0" rtl="0">
+              <a:spcBef>
+                <a:spcPts val="0"/>
+              </a:spcBef>
+              <a:buNone/>
+            </a:pPr>
+            <a:endParaRPr/>
+          </a:p>
+        </p:txBody>
+      </p:sp>
+      <p:cxnSp>
+        <p:nvCxnSpPr>
+          <p:cNvPr id="92" name="Shape 92"/>
+          <p:cNvCxnSpPr>
+            <a:stCxn id="88" idx="2"/>
+            <a:endCxn id="91" idx="0"/>
+          </p:cNvCxnSpPr>
+          <p:nvPr/>
+        </p:nvCxnSpPr>
+        <p:spPr>
+          <a:xfrm rot="5400000">
+            <a:off x="5370725" y="767598"/>
+            <a:ext cx="508800" cy="2478300"/>
+          </a:xfrm>
+          <a:prstGeom prst="bentConnector3">
+            <a:avLst>
+              <a:gd name="adj1" fmla="val 35235"/>
+            </a:avLst>
+          </a:prstGeom>
+          <a:noFill/>
+          <a:ln w="28575" cap="flat" cmpd="sng">
+            <a:solidFill>
+              <a:schemeClr val="dk2"/>
+            </a:solidFill>
+            <a:prstDash val="solid"/>
+            <a:round/>
+            <a:headEnd type="none" w="lg" len="lg"/>
+            <a:tailEnd type="triangle" w="lg" len="lg"/>
+          </a:ln>
+        </p:spPr>
+      </p:cxnSp>
+      <p:sp>
+        <p:nvSpPr>
+          <p:cNvPr id="93" name="Shape 93"/>
+          <p:cNvSpPr txBox="1"/>
+          <p:nvPr/>
+        </p:nvSpPr>
+        <p:spPr>
+          <a:xfrm>
+            <a:off x="4502025" y="4017952"/>
+            <a:ext cx="3627300" cy="502800"/>
+          </a:xfrm>
+          <a:prstGeom prst="rect">
+            <a:avLst/>
+          </a:prstGeom>
+          <a:noFill/>
+          <a:ln w="19050" cap="flat" cmpd="sng">
+            <a:solidFill>
+              <a:srgbClr val="000000"/>
+            </a:solidFill>
+            <a:prstDash val="solid"/>
+            <a:round/>
+            <a:headEnd type="none" w="med" len="med"/>
+            <a:tailEnd type="none" w="med" len="med"/>
+          </a:ln>
+        </p:spPr>
+        <p:txBody>
+          <a:bodyPr lIns="91425" tIns="91425" rIns="91425" bIns="91425" anchor="ctr" anchorCtr="0">
+            <a:noAutofit/>
+          </a:bodyPr>
+          <a:lstStyle/>
+          <a:p>
+            <a:pPr lvl="0" algn="ctr" rtl="0">
+              <a:spcBef>
+                <a:spcPts val="0"/>
+              </a:spcBef>
+              <a:buNone/>
+            </a:pPr>
+            <a:r>
+              <a:rPr lang="en-GB" sz="1800" b="1"/>
+              <a:t>DatastorageProvider</a:t>
+            </a:r>
+          </a:p>
+          <a:p>
+            <a:pPr lvl="0" rtl="0">
+              <a:spcBef>
+                <a:spcPts val="0"/>
+              </a:spcBef>
+              <a:buNone/>
+            </a:pPr>
+            <a:endParaRPr/>
+          </a:p>
+        </p:txBody>
+      </p:sp>
+      <p:sp>
+        <p:nvSpPr>
+          <p:cNvPr id="94" name="Shape 94"/>
+          <p:cNvSpPr txBox="1"/>
+          <p:nvPr/>
+        </p:nvSpPr>
+        <p:spPr>
+          <a:xfrm>
+            <a:off x="621235" y="4014950"/>
+            <a:ext cx="3486600" cy="502800"/>
+          </a:xfrm>
+          <a:prstGeom prst="rect">
+            <a:avLst/>
+          </a:prstGeom>
+          <a:noFill/>
+          <a:ln w="19050" cap="flat" cmpd="sng">
+            <a:solidFill>
+              <a:srgbClr val="000000"/>
+            </a:solidFill>
+            <a:prstDash val="solid"/>
+            <a:round/>
+            <a:headEnd type="none" w="med" len="med"/>
+            <a:tailEnd type="none" w="med" len="med"/>
+          </a:ln>
+        </p:spPr>
+        <p:txBody>
+          <a:bodyPr lIns="91425" tIns="91425" rIns="91425" bIns="91425" anchor="ctr" anchorCtr="0">
+            <a:noAutofit/>
+          </a:bodyPr>
+          <a:lstStyle/>
+          <a:p>
+            <a:pPr lvl="0" algn="ctr" rtl="0">
+              <a:spcBef>
+                <a:spcPts val="0"/>
+              </a:spcBef>
+              <a:buNone/>
+            </a:pPr>
+            <a:r>
+              <a:rPr lang="en-GB" sz="1800" b="1"/>
+              <a:t>GridDialect</a:t>
+            </a:r>
+          </a:p>
+          <a:p>
+            <a:pPr lvl="0" rtl="0">
+              <a:spcBef>
+                <a:spcPts val="0"/>
+              </a:spcBef>
+              <a:buNone/>
+            </a:pPr>
+            <a:endParaRPr/>
+          </a:p>
+        </p:txBody>
+      </p:sp>
+      <p:cxnSp>
+        <p:nvCxnSpPr>
+          <p:cNvPr id="95" name="Shape 95"/>
+          <p:cNvCxnSpPr/>
+          <p:nvPr/>
+        </p:nvCxnSpPr>
+        <p:spPr>
+          <a:xfrm>
+            <a:off x="7291473" y="2917175"/>
+            <a:ext cx="0" cy="688200"/>
+          </a:xfrm>
+          <a:prstGeom prst="straightConnector1">
+            <a:avLst/>
+          </a:prstGeom>
+          <a:noFill/>
+          <a:ln w="28575" cap="flat" cmpd="sng">
+            <a:solidFill>
+              <a:schemeClr val="dk2"/>
+            </a:solidFill>
+            <a:prstDash val="solid"/>
+            <a:round/>
+            <a:headEnd type="none" w="lg" len="lg"/>
+            <a:tailEnd type="triangle" w="lg" len="lg"/>
+          </a:ln>
+        </p:spPr>
+      </p:cxnSp>
+      <p:sp>
+        <p:nvSpPr>
+          <p:cNvPr id="96" name="Shape 96"/>
+          <p:cNvSpPr txBox="1"/>
+          <p:nvPr/>
+        </p:nvSpPr>
+        <p:spPr>
+          <a:xfrm>
+            <a:off x="7297103" y="3055050"/>
+            <a:ext cx="933600" cy="326400"/>
+          </a:xfrm>
+          <a:prstGeom prst="rect">
+            <a:avLst/>
+          </a:prstGeom>
+          <a:noFill/>
+          <a:ln>
+            <a:noFill/>
+          </a:ln>
+        </p:spPr>
+        <p:txBody>
+          <a:bodyPr lIns="91425" tIns="91425" rIns="91425" bIns="91425" anchor="t" anchorCtr="0">
+            <a:noAutofit/>
+          </a:bodyPr>
+          <a:lstStyle/>
+          <a:p>
+            <a:pPr lvl="0" algn="ctr">
+              <a:spcBef>
+                <a:spcPts val="0"/>
+              </a:spcBef>
+              <a:buNone/>
+            </a:pPr>
+            <a:r>
+              <a:rPr lang="en-GB"/>
+              <a:t>1.begin()</a:t>
+            </a:r>
+          </a:p>
+        </p:txBody>
+      </p:sp>
+      <p:sp>
+        <p:nvSpPr>
+          <p:cNvPr id="97" name="Shape 97"/>
+          <p:cNvSpPr txBox="1"/>
+          <p:nvPr/>
+        </p:nvSpPr>
+        <p:spPr>
+          <a:xfrm>
+            <a:off x="572095" y="3102437"/>
+            <a:ext cx="1166399" cy="326400"/>
+          </a:xfrm>
+          <a:prstGeom prst="rect">
+            <a:avLst/>
+          </a:prstGeom>
+          <a:noFill/>
+          <a:ln>
+            <a:noFill/>
+          </a:ln>
+        </p:spPr>
+        <p:txBody>
+          <a:bodyPr lIns="91425" tIns="91425" rIns="91425" bIns="91425" anchor="t" anchorCtr="0">
+            <a:noAutofit/>
+          </a:bodyPr>
+          <a:lstStyle/>
+          <a:p>
+            <a:pPr lvl="0" algn="ctr" rtl="0">
+              <a:spcBef>
+                <a:spcPts val="0"/>
+              </a:spcBef>
+              <a:buNone/>
+            </a:pPr>
+            <a:r>
+              <a:rPr lang="en-GB"/>
+              <a:t>4.commit()</a:t>
+            </a:r>
+          </a:p>
+        </p:txBody>
+      </p:sp>
+      <p:sp>
+        <p:nvSpPr>
+          <p:cNvPr id="98" name="Shape 98"/>
+          <p:cNvSpPr txBox="1"/>
+          <p:nvPr/>
+        </p:nvSpPr>
+        <p:spPr>
+          <a:xfrm>
+            <a:off x="5028994" y="3102450"/>
+            <a:ext cx="1449300" cy="326400"/>
+          </a:xfrm>
+          <a:prstGeom prst="rect">
+            <a:avLst/>
+          </a:prstGeom>
+          <a:noFill/>
+          <a:ln>
+            <a:noFill/>
+          </a:ln>
+        </p:spPr>
+        <p:txBody>
+          <a:bodyPr lIns="91425" tIns="91425" rIns="91425" bIns="91425" anchor="t" anchorCtr="0">
+            <a:noAutofit/>
+          </a:bodyPr>
+          <a:lstStyle/>
+          <a:p>
+            <a:pPr lvl="0" algn="ctr" rtl="0">
+              <a:spcBef>
+                <a:spcPts val="0"/>
+              </a:spcBef>
+              <a:buNone/>
+            </a:pPr>
+            <a:r>
+              <a:rPr lang="en-GB"/>
+              <a:t>2.createTuple()</a:t>
+            </a:r>
+          </a:p>
+        </p:txBody>
+      </p:sp>
+      <p:sp>
+        <p:nvSpPr>
+          <p:cNvPr id="99" name="Shape 99"/>
+          <p:cNvSpPr txBox="1"/>
+          <p:nvPr/>
+        </p:nvSpPr>
+        <p:spPr>
+          <a:xfrm>
+            <a:off x="2460783" y="3102450"/>
+            <a:ext cx="1354499" cy="326400"/>
+          </a:xfrm>
+          <a:prstGeom prst="rect">
+            <a:avLst/>
+          </a:prstGeom>
+          <a:noFill/>
+          <a:ln>
+            <a:noFill/>
+          </a:ln>
+        </p:spPr>
+        <p:txBody>
+          <a:bodyPr lIns="91425" tIns="91425" rIns="91425" bIns="91425" anchor="t" anchorCtr="0">
+            <a:noAutofit/>
+          </a:bodyPr>
+          <a:lstStyle/>
+          <a:p>
+            <a:pPr lvl="0" algn="ctr" rtl="0">
+              <a:spcBef>
+                <a:spcPts val="0"/>
+              </a:spcBef>
+              <a:buNone/>
+            </a:pPr>
+            <a:r>
+              <a:rPr lang="en-GB"/>
+              <a:t>3.insertTuple()</a:t>
+            </a:r>
+          </a:p>
+        </p:txBody>
+      </p:sp>
+      <p:sp>
+        <p:nvSpPr>
+          <p:cNvPr id="100" name="Shape 100"/>
+          <p:cNvSpPr txBox="1">
+            <a:spLocks noGrp="1"/>
+          </p:cNvSpPr>
+          <p:nvPr>
+            <p:ph type="sldNum" idx="12"/>
+          </p:nvPr>
+        </p:nvSpPr>
+        <p:spPr>
+          <a:xfrm>
+            <a:off x="8472457" y="4663216"/>
+            <a:ext cx="548700" cy="393600"/>
+          </a:xfrm>
+          <a:prstGeom prst="rect">
+            <a:avLst/>
+          </a:prstGeom>
+        </p:spPr>
+        <p:txBody>
+          <a:bodyPr lIns="91425" tIns="91425" rIns="91425" bIns="91425" anchor="ctr" anchorCtr="0">
+            <a:noAutofit/>
+          </a:bodyPr>
+          <a:lstStyle/>
+          <a:p>
+            <a:pPr lvl="0">
+              <a:spcBef>
+                <a:spcPts val="0"/>
+              </a:spcBef>
+              <a:buNone/>
+            </a:pPr>
+            <a:fld id="{00000000-1234-1234-1234-123412341234}" type="slidenum">
+              <a:rPr lang="en-GB"/>
+              <a:t>8</a:t>
+            </a:fld>
+            <a:endParaRPr lang="en-GB"/>
+          </a:p>
+        </p:txBody>
+      </p:sp>
+      <p:cxnSp>
+        <p:nvCxnSpPr>
+          <p:cNvPr id="101" name="Shape 101"/>
+          <p:cNvCxnSpPr/>
+          <p:nvPr/>
+        </p:nvCxnSpPr>
+        <p:spPr>
+          <a:xfrm>
+            <a:off x="553170" y="2901145"/>
+            <a:ext cx="0" cy="688199"/>
+          </a:xfrm>
+          <a:prstGeom prst="straightConnector1">
+            <a:avLst/>
+          </a:prstGeom>
+          <a:noFill/>
+          <a:ln w="28575" cap="flat" cmpd="sng">
+            <a:solidFill>
+              <a:schemeClr val="dk2"/>
+            </a:solidFill>
+            <a:prstDash val="solid"/>
+            <a:round/>
+            <a:headEnd type="none" w="lg" len="lg"/>
+            <a:tailEnd type="triangle" w="lg" len="lg"/>
+          </a:ln>
+        </p:spPr>
+      </p:cxnSp>
+      <p:cxnSp>
+        <p:nvCxnSpPr>
+          <p:cNvPr id="102" name="Shape 102"/>
+          <p:cNvCxnSpPr/>
+          <p:nvPr/>
+        </p:nvCxnSpPr>
+        <p:spPr>
+          <a:xfrm>
+            <a:off x="5040719" y="2921537"/>
+            <a:ext cx="0" cy="688200"/>
+          </a:xfrm>
+          <a:prstGeom prst="straightConnector1">
+            <a:avLst/>
+          </a:prstGeom>
+          <a:noFill/>
+          <a:ln w="28575" cap="flat" cmpd="sng">
+            <a:solidFill>
+              <a:schemeClr val="dk2"/>
+            </a:solidFill>
+            <a:prstDash val="solid"/>
+            <a:round/>
+            <a:headEnd type="triangle" w="lg" len="lg"/>
+            <a:tailEnd type="triangle" w="lg" len="lg"/>
+          </a:ln>
+        </p:spPr>
+      </p:cxnSp>
+      <p:cxnSp>
+        <p:nvCxnSpPr>
+          <p:cNvPr id="103" name="Shape 103"/>
+          <p:cNvCxnSpPr/>
+          <p:nvPr/>
+        </p:nvCxnSpPr>
+        <p:spPr>
+          <a:xfrm>
+            <a:off x="2495070" y="2919394"/>
+            <a:ext cx="0" cy="688200"/>
+          </a:xfrm>
+          <a:prstGeom prst="straightConnector1">
+            <a:avLst/>
+          </a:prstGeom>
+          <a:noFill/>
+          <a:ln w="28575" cap="flat" cmpd="sng">
+            <a:solidFill>
+              <a:schemeClr val="dk2"/>
+            </a:solidFill>
+            <a:prstDash val="solid"/>
+            <a:round/>
+            <a:headEnd type="triangle" w="lg" len="lg"/>
+            <a:tailEnd type="triangle" w="lg" len="lg"/>
+          </a:ln>
+        </p:spPr>
+      </p:cxnSp>
+    </p:spTree>
+  </p:cSld>
+  <p:clrMapOvr>
+    <a:masterClrMapping/>
+  </p:clrMapOvr>
+  <p:timing>
+    <p:tnLst>
+      <p:par>
+        <p:cTn id="1" dur="indefinite" restart="never" nodeType="tmRoot"/>
+      </p:par>
+    </p:tnLst>
+  </p:timing>
+</p:sld>
+</file>
+
+<file path=ppt/slides/slide9.xml><?xml version="1.0" encoding="utf-8"?>
+<p:sld xmlns:a="http://schemas.openxmlformats.org/drawingml/2006/main" xmlns:r="http://schemas.openxmlformats.org/officeDocument/2006/relationships" xmlns:p="http://schemas.openxmlformats.org/presentationml/2006/main">
+  <p:cSld>
+    <p:spTree>
+      <p:nvGrpSpPr>
+        <p:cNvPr id="1" name="Shape 79"/>
+        <p:cNvGrpSpPr/>
+        <p:nvPr/>
+      </p:nvGrpSpPr>
+      <p:grpSpPr>
+        <a:xfrm>
+          <a:off x="0" y="0"/>
+          <a:ext cx="0" cy="0"/>
+          <a:chOff x="0" y="0"/>
+          <a:chExt cx="0" cy="0"/>
+        </a:xfrm>
+      </p:grpSpPr>
+      <p:sp>
+        <p:nvSpPr>
+          <p:cNvPr id="80" name="Shape 80"/>
+          <p:cNvSpPr txBox="1">
+            <a:spLocks noGrp="1"/>
+          </p:cNvSpPr>
+          <p:nvPr>
+            <p:ph type="sldNum" idx="12"/>
+          </p:nvPr>
+        </p:nvSpPr>
+        <p:spPr>
+          <a:xfrm>
+            <a:off x="8472457" y="4663216"/>
+            <a:ext cx="548700" cy="393600"/>
+          </a:xfrm>
+          <a:prstGeom prst="rect">
+            <a:avLst/>
+          </a:prstGeom>
+        </p:spPr>
+        <p:txBody>
+          <a:bodyPr lIns="91425" tIns="91425" rIns="91425" bIns="91425" anchor="ctr" anchorCtr="0">
+            <a:noAutofit/>
+          </a:bodyPr>
+          <a:lstStyle/>
+          <a:p>
+            <a:pPr lvl="0">
+              <a:spcBef>
+                <a:spcPts val="0"/>
+              </a:spcBef>
+              <a:buNone/>
+            </a:pPr>
+            <a:fld id="{00000000-1234-1234-1234-123412341234}" type="slidenum">
+              <a:rPr lang="en-GB"/>
+              <a:t>9</a:t>
+            </a:fld>
+            <a:endParaRPr lang="en-GB"/>
+          </a:p>
+        </p:txBody>
+      </p:sp>
+      <p:sp>
+        <p:nvSpPr>
+          <p:cNvPr id="81" name="Shape 81"/>
+          <p:cNvSpPr txBox="1"/>
+          <p:nvPr/>
+        </p:nvSpPr>
+        <p:spPr>
+          <a:xfrm>
+            <a:off x="524850" y="431550"/>
+            <a:ext cx="8117700" cy="4150724"/>
+          </a:xfrm>
+          <a:prstGeom prst="rect">
+            <a:avLst/>
+          </a:prstGeom>
+          <a:noFill/>
+          <a:ln>
+            <a:noFill/>
+          </a:ln>
+        </p:spPr>
+        <p:txBody>
+          <a:bodyPr lIns="91425" tIns="91425" rIns="91425" bIns="91425" numCol="1" anchor="t" anchorCtr="0">
+            <a:noAutofit/>
+          </a:bodyPr>
+          <a:lstStyle/>
+          <a:p>
+            <a:pPr marL="558800" lvl="1" indent="-457200">
+              <a:lnSpc>
+                <a:spcPct val="200000"/>
+              </a:lnSpc>
+              <a:buSzPct val="100000"/>
+              <a:buFont typeface="+mj-lt"/>
+              <a:buAutoNum type="arabicPeriod" startAt="7"/>
+            </a:pPr>
+            <a:r>
+              <a:rPr lang="en-GB" sz="2000" b="1" dirty="0" smtClean="0"/>
+              <a:t>Performance</a:t>
+            </a:r>
+            <a:endParaRPr lang="en-GB" sz="2000" b="1" dirty="0"/>
+          </a:p>
+        </p:txBody>
+      </p:sp>
+    </p:spTree>
+    <p:extLst>
+      <p:ext uri="{BB962C8B-B14F-4D97-AF65-F5344CB8AC3E}">
+        <p14:creationId xmlns:p14="http://schemas.microsoft.com/office/powerpoint/2010/main" val="4148259363"/>
+      </p:ext>
+    </p:extLst>
   </p:cSld>
   <p:clrMapOvr>
     <a:masterClrMapping/>

</xml_diff>